<commit_message>
Added more info about the presentation on the README file and corrected an error on Page 15 of the presentation
</commit_message>
<xml_diff>
--- a/Lecture 9/CNN_Rockville_Session 7.pptx
+++ b/Lecture 9/CNN_Rockville_Session 7.pptx
@@ -123,6 +123,22 @@
       </a:defRPr>
     </a:lvl9pPr>
   </p:defaultTextStyle>
+  <p:extLst>
+    <p:ext uri="{EFAFB233-063F-42B5-8137-9DF3F51BA10A}">
+      <p15:sldGuideLst xmlns:p15="http://schemas.microsoft.com/office/powerpoint/2012/main">
+        <p15:guide id="1" orient="horz" pos="2160">
+          <p15:clr>
+            <a:srgbClr val="A4A3A4"/>
+          </p15:clr>
+        </p15:guide>
+        <p15:guide id="2" pos="2880">
+          <p15:clr>
+            <a:srgbClr val="A4A3A4"/>
+          </p15:clr>
+        </p15:guide>
+      </p15:sldGuideLst>
+    </p:ext>
+  </p:extLst>
 </p:presentation>
 </file>
 
@@ -534,7 +550,7 @@
                 <a:latin typeface="Source Sans Pro"/>
                 <a:ea typeface="DejaVu Sans"/>
               </a:rPr>
-              <a:t>10/13/2018</a:t>
+              <a:t>4/3/2019</a:t>
             </a:fld>
             <a:endParaRPr lang="en-US" sz="1200" b="0" strike="noStrike" spc="-1">
               <a:solidFill>
@@ -2456,7 +2472,7 @@
                 </a:uFill>
                 <a:latin typeface="Calibri"/>
               </a:rPr>
-              <a:t>10/13/2018</a:t>
+              <a:t>4/3/2019</a:t>
             </a:fld>
             <a:endParaRPr lang="en-US" sz="1200" b="0" strike="noStrike" spc="-1">
               <a:solidFill>
@@ -2862,10 +2878,6 @@
                 <a:spcPct val="100000"/>
               </a:lnSpc>
             </a:pPr>
-            <a:r>
-              <a:rPr dirty="0"/>
-              <a:t/>
-            </a:r>
             <a:br>
               <a:rPr dirty="0"/>
             </a:br>
@@ -2887,7 +2899,7 @@
                 <a:spcPct val="100000"/>
               </a:lnSpc>
             </a:pPr>
-            <a:endParaRPr lang="en-US" sz="6500" b="0" strike="noStrike" spc="-1" dirty="0" smtClean="0">
+            <a:endParaRPr lang="en-US" sz="6500" b="0" strike="noStrike" spc="-1" dirty="0">
               <a:solidFill>
                 <a:srgbClr val="04617B"/>
               </a:solidFill>
@@ -2925,7 +2937,7 @@
                 <a:spcPct val="100000"/>
               </a:lnSpc>
             </a:pPr>
-            <a:endParaRPr lang="en-US" sz="6500" b="0" strike="noStrike" spc="-1" dirty="0" smtClean="0">
+            <a:endParaRPr lang="en-US" sz="6500" b="0" strike="noStrike" spc="-1" dirty="0">
               <a:solidFill>
                 <a:srgbClr val="04617B"/>
               </a:solidFill>
@@ -2963,7 +2975,7 @@
                 <a:spcPct val="100000"/>
               </a:lnSpc>
             </a:pPr>
-            <a:endParaRPr lang="en-US" sz="6500" b="0" strike="noStrike" spc="-1" dirty="0" smtClean="0">
+            <a:endParaRPr lang="en-US" sz="6500" b="0" strike="noStrike" spc="-1" dirty="0">
               <a:solidFill>
                 <a:srgbClr val="04617B"/>
               </a:solidFill>
@@ -3001,7 +3013,7 @@
                 <a:spcPct val="100000"/>
               </a:lnSpc>
             </a:pPr>
-            <a:endParaRPr lang="en-US" sz="6500" b="0" strike="noStrike" spc="-1" dirty="0" smtClean="0">
+            <a:endParaRPr lang="en-US" sz="6500" b="0" strike="noStrike" spc="-1" dirty="0">
               <a:solidFill>
                 <a:srgbClr val="04617B"/>
               </a:solidFill>
@@ -3020,7 +3032,7 @@
                 <a:spcPct val="100000"/>
               </a:lnSpc>
             </a:pPr>
-            <a:endParaRPr lang="en-US" sz="6500" b="0" strike="noStrike" spc="-1" dirty="0" smtClean="0">
+            <a:endParaRPr lang="en-US" sz="6500" b="0" strike="noStrike" spc="-1" dirty="0">
               <a:solidFill>
                 <a:srgbClr val="04617B"/>
               </a:solidFill>
@@ -3058,7 +3070,7 @@
                 <a:spcPct val="100000"/>
               </a:lnSpc>
             </a:pPr>
-            <a:endParaRPr lang="en-US" sz="6500" b="0" strike="noStrike" spc="-1" dirty="0" smtClean="0">
+            <a:endParaRPr lang="en-US" sz="6500" b="0" strike="noStrike" spc="-1" dirty="0">
               <a:solidFill>
                 <a:srgbClr val="04617B"/>
               </a:solidFill>
@@ -3096,7 +3108,7 @@
                 <a:spcPct val="100000"/>
               </a:lnSpc>
             </a:pPr>
-            <a:endParaRPr lang="en-US" sz="6500" b="0" strike="noStrike" spc="-1" dirty="0" smtClean="0">
+            <a:endParaRPr lang="en-US" sz="6500" b="0" strike="noStrike" spc="-1" dirty="0">
               <a:solidFill>
                 <a:srgbClr val="04617B"/>
               </a:solidFill>
@@ -3134,7 +3146,7 @@
                 <a:spcPct val="100000"/>
               </a:lnSpc>
             </a:pPr>
-            <a:endParaRPr lang="en-US" sz="6500" b="0" strike="noStrike" spc="-1" dirty="0" smtClean="0">
+            <a:endParaRPr lang="en-US" sz="6500" b="0" strike="noStrike" spc="-1" dirty="0">
               <a:solidFill>
                 <a:srgbClr val="04617B"/>
               </a:solidFill>
@@ -3166,10 +3178,112 @@
                 <a:latin typeface="Source Sans Pro Light"/>
                 <a:ea typeface="DejaVu Sans"/>
               </a:rPr>
-              <a:t> </a:t>
-            </a:r>
-            <a:r>
-              <a:rPr lang="en-US" sz="6500" spc="-1" dirty="0" smtClean="0">
+              <a:t>  </a:t>
+            </a:r>
+          </a:p>
+          <a:p>
+            <a:pPr>
+              <a:lnSpc>
+                <a:spcPct val="100000"/>
+              </a:lnSpc>
+            </a:pPr>
+            <a:endParaRPr lang="en-US" sz="6500" b="0" strike="noStrike" spc="-1" dirty="0">
+              <a:solidFill>
+                <a:srgbClr val="04617B"/>
+              </a:solidFill>
+              <a:uFill>
+                <a:solidFill>
+                  <a:srgbClr val="FFFFFF"/>
+                </a:solidFill>
+              </a:uFill>
+              <a:latin typeface="Source Sans Pro Light"/>
+              <a:ea typeface="DejaVu Sans"/>
+            </a:endParaRPr>
+          </a:p>
+          <a:p>
+            <a:pPr>
+              <a:lnSpc>
+                <a:spcPct val="100000"/>
+              </a:lnSpc>
+            </a:pPr>
+            <a:endParaRPr lang="en-US" sz="6500" spc="-1" dirty="0">
+              <a:solidFill>
+                <a:srgbClr val="04617B"/>
+              </a:solidFill>
+              <a:uFill>
+                <a:solidFill>
+                  <a:srgbClr val="FFFFFF"/>
+                </a:solidFill>
+              </a:uFill>
+              <a:latin typeface="Source Sans Pro Light"/>
+              <a:ea typeface="DejaVu Sans"/>
+            </a:endParaRPr>
+          </a:p>
+          <a:p>
+            <a:pPr>
+              <a:lnSpc>
+                <a:spcPct val="100000"/>
+              </a:lnSpc>
+            </a:pPr>
+            <a:endParaRPr lang="en-US" sz="6500" b="0" strike="noStrike" spc="-1" dirty="0">
+              <a:solidFill>
+                <a:srgbClr val="04617B"/>
+              </a:solidFill>
+              <a:uFill>
+                <a:solidFill>
+                  <a:srgbClr val="FFFFFF"/>
+                </a:solidFill>
+              </a:uFill>
+              <a:latin typeface="Source Sans Pro Light"/>
+              <a:ea typeface="DejaVu Sans"/>
+            </a:endParaRPr>
+          </a:p>
+          <a:p>
+            <a:pPr>
+              <a:lnSpc>
+                <a:spcPct val="100000"/>
+              </a:lnSpc>
+            </a:pPr>
+            <a:endParaRPr lang="en-US" sz="6500" spc="-1" dirty="0">
+              <a:solidFill>
+                <a:srgbClr val="04617B"/>
+              </a:solidFill>
+              <a:uFill>
+                <a:solidFill>
+                  <a:srgbClr val="FFFFFF"/>
+                </a:solidFill>
+              </a:uFill>
+              <a:latin typeface="Source Sans Pro Light"/>
+              <a:ea typeface="DejaVu Sans"/>
+            </a:endParaRPr>
+          </a:p>
+          <a:p>
+            <a:pPr>
+              <a:lnSpc>
+                <a:spcPct val="100000"/>
+              </a:lnSpc>
+            </a:pPr>
+            <a:endParaRPr lang="en-US" sz="6500" b="0" strike="noStrike" spc="-1" dirty="0">
+              <a:solidFill>
+                <a:srgbClr val="04617B"/>
+              </a:solidFill>
+              <a:uFill>
+                <a:solidFill>
+                  <a:srgbClr val="FFFFFF"/>
+                </a:solidFill>
+              </a:uFill>
+              <a:latin typeface="Source Sans Pro Light"/>
+              <a:ea typeface="DejaVu Sans"/>
+            </a:endParaRPr>
+          </a:p>
+          <a:p>
+            <a:pPr>
+              <a:lnSpc>
+                <a:spcPct val="100000"/>
+              </a:lnSpc>
+            </a:pPr>
+            <a:r>
+              <a:rPr lang="en-US" sz="6000" b="0" strike="noStrike" spc="-1" dirty="0">
                 <a:solidFill>
                   <a:srgbClr val="04617B"/>
                 </a:solidFill>
@@ -3181,139 +3295,7 @@
                 <a:latin typeface="Source Sans Pro Light"/>
                 <a:ea typeface="DejaVu Sans"/>
               </a:rPr>
-              <a:t> </a:t>
-            </a:r>
-          </a:p>
-          <a:p>
-            <a:pPr>
-              <a:lnSpc>
-                <a:spcPct val="100000"/>
-              </a:lnSpc>
-            </a:pPr>
-            <a:endParaRPr lang="en-US" sz="6500" b="0" strike="noStrike" spc="-1" dirty="0">
-              <a:solidFill>
-                <a:srgbClr val="04617B"/>
-              </a:solidFill>
-              <a:uFill>
-                <a:solidFill>
-                  <a:srgbClr val="FFFFFF"/>
-                </a:solidFill>
-              </a:uFill>
-              <a:latin typeface="Source Sans Pro Light"/>
-              <a:ea typeface="DejaVu Sans"/>
-            </a:endParaRPr>
-          </a:p>
-          <a:p>
-            <a:pPr>
-              <a:lnSpc>
-                <a:spcPct val="100000"/>
-              </a:lnSpc>
-            </a:pPr>
-            <a:endParaRPr lang="en-US" sz="6500" spc="-1" dirty="0" smtClean="0">
-              <a:solidFill>
-                <a:srgbClr val="04617B"/>
-              </a:solidFill>
-              <a:uFill>
-                <a:solidFill>
-                  <a:srgbClr val="FFFFFF"/>
-                </a:solidFill>
-              </a:uFill>
-              <a:latin typeface="Source Sans Pro Light"/>
-              <a:ea typeface="DejaVu Sans"/>
-            </a:endParaRPr>
-          </a:p>
-          <a:p>
-            <a:pPr>
-              <a:lnSpc>
-                <a:spcPct val="100000"/>
-              </a:lnSpc>
-            </a:pPr>
-            <a:endParaRPr lang="en-US" sz="6500" b="0" strike="noStrike" spc="-1" dirty="0">
-              <a:solidFill>
-                <a:srgbClr val="04617B"/>
-              </a:solidFill>
-              <a:uFill>
-                <a:solidFill>
-                  <a:srgbClr val="FFFFFF"/>
-                </a:solidFill>
-              </a:uFill>
-              <a:latin typeface="Source Sans Pro Light"/>
-              <a:ea typeface="DejaVu Sans"/>
-            </a:endParaRPr>
-          </a:p>
-          <a:p>
-            <a:pPr>
-              <a:lnSpc>
-                <a:spcPct val="100000"/>
-              </a:lnSpc>
-            </a:pPr>
-            <a:endParaRPr lang="en-US" sz="6500" spc="-1" dirty="0" smtClean="0">
-              <a:solidFill>
-                <a:srgbClr val="04617B"/>
-              </a:solidFill>
-              <a:uFill>
-                <a:solidFill>
-                  <a:srgbClr val="FFFFFF"/>
-                </a:solidFill>
-              </a:uFill>
-              <a:latin typeface="Source Sans Pro Light"/>
-              <a:ea typeface="DejaVu Sans"/>
-            </a:endParaRPr>
-          </a:p>
-          <a:p>
-            <a:pPr>
-              <a:lnSpc>
-                <a:spcPct val="100000"/>
-              </a:lnSpc>
-            </a:pPr>
-            <a:endParaRPr lang="en-US" sz="6500" b="0" strike="noStrike" spc="-1" dirty="0">
-              <a:solidFill>
-                <a:srgbClr val="04617B"/>
-              </a:solidFill>
-              <a:uFill>
-                <a:solidFill>
-                  <a:srgbClr val="FFFFFF"/>
-                </a:solidFill>
-              </a:uFill>
-              <a:latin typeface="Source Sans Pro Light"/>
-              <a:ea typeface="DejaVu Sans"/>
-            </a:endParaRPr>
-          </a:p>
-          <a:p>
-            <a:pPr>
-              <a:lnSpc>
-                <a:spcPct val="100000"/>
-              </a:lnSpc>
-            </a:pPr>
-            <a:r>
-              <a:rPr lang="en-US" sz="6000" b="0" strike="noStrike" spc="-1" dirty="0" smtClean="0">
-                <a:solidFill>
-                  <a:srgbClr val="04617B"/>
-                </a:solidFill>
-                <a:uFill>
-                  <a:solidFill>
-                    <a:srgbClr val="FFFFFF"/>
-                  </a:solidFill>
-                </a:uFill>
-                <a:latin typeface="Source Sans Pro Light"/>
-                <a:ea typeface="DejaVu Sans"/>
-              </a:rPr>
-              <a:t>Deep </a:t>
-            </a:r>
-            <a:r>
-              <a:rPr lang="en-US" sz="6000" b="0" strike="noStrike" spc="-1" dirty="0">
-                <a:solidFill>
-                  <a:srgbClr val="04617B"/>
-                </a:solidFill>
-                <a:uFill>
-                  <a:solidFill>
-                    <a:srgbClr val="FFFFFF"/>
-                  </a:solidFill>
-                </a:uFill>
-                <a:latin typeface="Source Sans Pro Light"/>
-                <a:ea typeface="DejaVu Sans"/>
-              </a:rPr>
-              <a:t>Learning</a:t>
+              <a:t>Deep Learning</a:t>
             </a:r>
             <a:endParaRPr lang="en-US" sz="6000" b="0" strike="noStrike" spc="-1" dirty="0">
               <a:solidFill>
@@ -3352,7 +3334,7 @@
               </a:lnSpc>
             </a:pPr>
             <a:r>
-              <a:rPr lang="en-US" sz="3600" b="1" strike="noStrike" spc="-1" dirty="0" smtClean="0">
+              <a:rPr lang="en-US" sz="3600" b="1" strike="noStrike" spc="-1" dirty="0">
                 <a:solidFill>
                   <a:schemeClr val="tx2"/>
                 </a:solidFill>
@@ -3396,7 +3378,7 @@
               <a:rPr lang="en-US" sz="1600" b="1" dirty="0"/>
               <a:t>Object detection is about classifying objects and define a bounding box around them.</a:t>
             </a:r>
-            <a:endParaRPr lang="en-US" sz="1600" b="1" strike="noStrike" spc="-1" dirty="0" smtClean="0">
+            <a:endParaRPr lang="en-US" sz="1600" b="1" strike="noStrike" spc="-1" dirty="0">
               <a:solidFill>
                 <a:schemeClr val="tx2"/>
               </a:solidFill>
@@ -3415,7 +3397,7 @@
                 <a:spcPct val="100000"/>
               </a:lnSpc>
             </a:pPr>
-            <a:endParaRPr lang="en-US" sz="2900" b="1" strike="noStrike" spc="-1" dirty="0" smtClean="0">
+            <a:endParaRPr lang="en-US" sz="2900" b="1" strike="noStrike" spc="-1" dirty="0">
               <a:solidFill>
                 <a:schemeClr val="tx2"/>
               </a:solidFill>
@@ -3435,7 +3417,7 @@
               </a:lnSpc>
             </a:pPr>
             <a:r>
-              <a:rPr lang="en-US" sz="2900" b="1" spc="-1" dirty="0" smtClean="0">
+              <a:rPr lang="en-US" sz="2900" b="1" spc="-1" dirty="0">
                 <a:solidFill>
                   <a:schemeClr val="tx2"/>
                 </a:solidFill>
@@ -3468,7 +3450,7 @@
               </a:lnSpc>
             </a:pPr>
             <a:r>
-              <a:rPr lang="en-US" sz="1200" strike="noStrike" spc="-1" dirty="0" smtClean="0">
+              <a:rPr lang="en-US" sz="1200" strike="noStrike" spc="-1" dirty="0">
                 <a:uFill>
                   <a:solidFill>
                     <a:srgbClr val="FFFFFF"/>
@@ -3598,7 +3580,7 @@
           <a:lstStyle/>
           <a:p>
             <a:r>
-              <a:rPr lang="en-US" b="1" dirty="0" smtClean="0"/>
+              <a:rPr lang="en-US" b="1" dirty="0"/>
               <a:t>RPN: Region Proposal Map</a:t>
             </a:r>
           </a:p>
@@ -3607,33 +3589,33 @@
           </a:p>
           <a:p>
             <a:r>
-              <a:rPr lang="en-US" dirty="0" smtClean="0"/>
+              <a:rPr lang="en-US" dirty="0"/>
               <a:t>The RPN, acts on the Feature Map generated by the </a:t>
             </a:r>
             <a:r>
-              <a:rPr lang="en-US" dirty="0" err="1" smtClean="0"/>
+              <a:rPr lang="en-US" dirty="0" err="1"/>
               <a:t>pretrained</a:t>
             </a:r>
             <a:r>
-              <a:rPr lang="en-US" dirty="0" smtClean="0"/>
+              <a:rPr lang="en-US" dirty="0"/>
               <a:t> CNN.</a:t>
             </a:r>
           </a:p>
           <a:p>
             <a:r>
-              <a:rPr lang="en-US" dirty="0" smtClean="0"/>
+              <a:rPr lang="en-US" dirty="0"/>
               <a:t>RPN is a  3x3 dimensional Block, that slides over the whole  Feature Map. </a:t>
             </a:r>
           </a:p>
           <a:p>
             <a:r>
-              <a:rPr lang="en-US" dirty="0" smtClean="0"/>
+              <a:rPr lang="en-US" dirty="0"/>
               <a:t>Allows each pixel in the Feature Map, to be the center of the 3x3 region.</a:t>
             </a:r>
           </a:p>
           <a:p>
             <a:r>
-              <a:rPr lang="en-US" dirty="0" smtClean="0"/>
+              <a:rPr lang="en-US" dirty="0"/>
               <a:t>At each sliding-window location, multiple region proposals are simultaneously predicted.</a:t>
             </a:r>
           </a:p>
@@ -3642,41 +3624,41 @@
           </a:p>
           <a:p>
             <a:r>
-              <a:rPr lang="en-US" dirty="0" smtClean="0"/>
+              <a:rPr lang="en-US" dirty="0"/>
               <a:t>Anchor:</a:t>
             </a:r>
           </a:p>
           <a:p>
             <a:r>
-              <a:rPr lang="en-US" dirty="0" smtClean="0"/>
+              <a:rPr lang="en-US" dirty="0"/>
               <a:t>It is always centered at the middle of the sliding window. </a:t>
             </a:r>
           </a:p>
           <a:p>
             <a:r>
-              <a:rPr lang="en-US" dirty="0" smtClean="0"/>
+              <a:rPr lang="en-US" dirty="0"/>
               <a:t>Each Anchor has a fixed scale and ratio.</a:t>
             </a:r>
           </a:p>
           <a:p>
             <a:r>
-              <a:rPr lang="en-US" dirty="0" smtClean="0"/>
+              <a:rPr lang="en-US" dirty="0"/>
               <a:t>Generally 9 anchors of different scales and Aspect Ratio are used.</a:t>
             </a:r>
           </a:p>
           <a:p>
             <a:r>
-              <a:rPr lang="en-US" dirty="0" smtClean="0"/>
+              <a:rPr lang="en-US" dirty="0"/>
               <a:t>Each Sliding Position has 9 Anchors.</a:t>
             </a:r>
           </a:p>
           <a:p>
             <a:r>
-              <a:rPr lang="en-US" b="1" u="sng" dirty="0" smtClean="0"/>
+              <a:rPr lang="en-US" b="1" u="sng" dirty="0"/>
               <a:t>The Anchors are applied  to the Input Image</a:t>
             </a:r>
             <a:r>
-              <a:rPr lang="en-US" dirty="0" smtClean="0"/>
+              <a:rPr lang="en-US" dirty="0"/>
               <a:t>.</a:t>
             </a:r>
           </a:p>
@@ -3900,24 +3882,24 @@
           <a:lstStyle/>
           <a:p>
             <a:r>
-              <a:rPr lang="en-US" b="1" dirty="0" smtClean="0"/>
+              <a:rPr lang="en-US" b="1" dirty="0"/>
               <a:t>Input</a:t>
             </a:r>
             <a:r>
-              <a:rPr lang="en-US" dirty="0" smtClean="0"/>
+              <a:rPr lang="en-US" dirty="0"/>
               <a:t>:  Feature Map ( 256/512/… Channels) , In the picture above, we have a depth of 256 Channels.</a:t>
             </a:r>
           </a:p>
           <a:p>
-            <a:endParaRPr lang="en-US" dirty="0" smtClean="0"/>
-          </a:p>
-          <a:p>
-            <a:r>
-              <a:rPr lang="en-US" b="1" dirty="0" smtClean="0"/>
+            <a:endParaRPr lang="en-US" dirty="0"/>
+          </a:p>
+          <a:p>
+            <a:r>
+              <a:rPr lang="en-US" b="1" dirty="0"/>
               <a:t>Sliding Window</a:t>
             </a:r>
             <a:r>
-              <a:rPr lang="en-US" dirty="0" smtClean="0"/>
+              <a:rPr lang="en-US" dirty="0"/>
               <a:t>: On this we run a 3x3 sliding window, which will give us an output of  1x1x 256 feature Vector (256-d) .</a:t>
             </a:r>
           </a:p>
@@ -3927,37 +3909,21 @@
           <a:p>
             <a:r>
               <a:rPr lang="en-US" b="1" dirty="0" err="1"/>
-              <a:t>c</a:t>
-            </a:r>
-            <a:r>
-              <a:rPr lang="en-US" b="1" dirty="0" err="1" smtClean="0"/>
-              <a:t>ls</a:t>
-            </a:r>
-            <a:r>
-              <a:rPr lang="en-US" b="1" dirty="0" smtClean="0"/>
+              <a:t>cls</a:t>
+            </a:r>
+            <a:r>
+              <a:rPr lang="en-US" b="1" dirty="0"/>
               <a:t> layer</a:t>
             </a:r>
             <a:r>
-              <a:rPr lang="en-US" dirty="0" smtClean="0"/>
-              <a:t>: Classification layer, we output we </a:t>
-            </a:r>
-            <a:r>
-              <a:rPr lang="en-US" dirty="0"/>
-              <a:t>two predictions per anchor: the score of it being background (not an object) and the score of it being foreground (an actual object</a:t>
-            </a:r>
-            <a:r>
-              <a:rPr lang="en-US" dirty="0" smtClean="0"/>
-              <a:t>). </a:t>
-            </a:r>
-          </a:p>
-          <a:p>
-            <a:r>
-              <a:rPr lang="en-US" dirty="0" smtClean="0"/>
-              <a:t>At this  point, we  don’t care </a:t>
-            </a:r>
-            <a:r>
-              <a:rPr lang="en-US" dirty="0"/>
-              <a:t>what </a:t>
+              <a:rPr lang="en-US" dirty="0"/>
+              <a:t>: Classification layer, we output we two predictions per anchor: the score of it being background (not an object) and the score of it being foreground (an actual object). </a:t>
+            </a:r>
+          </a:p>
+          <a:p>
+            <a:r>
+              <a:rPr lang="en-US" dirty="0"/>
+              <a:t>At this  point, we  don’t care what </a:t>
             </a:r>
             <a:r>
               <a:rPr lang="en-US" i="1" dirty="0"/>
@@ -3965,61 +3931,53 @@
             </a:r>
             <a:r>
               <a:rPr lang="en-US" dirty="0"/>
-              <a:t> of object it is, only that it does in fact look like an object (and not background</a:t>
-            </a:r>
-            <a:r>
-              <a:rPr lang="en-US" dirty="0" smtClean="0"/>
-              <a:t>).</a:t>
-            </a:r>
-          </a:p>
-          <a:p>
-            <a:endParaRPr lang="en-US" dirty="0" smtClean="0"/>
+              <a:t> of object it is, only that it does in fact look like an object (and not background).</a:t>
+            </a:r>
+          </a:p>
+          <a:p>
+            <a:endParaRPr lang="en-US" dirty="0"/>
           </a:p>
           <a:p>
             <a:r>
               <a:rPr lang="en-US" b="1" dirty="0" err="1"/>
-              <a:t>r</a:t>
-            </a:r>
-            <a:r>
-              <a:rPr lang="en-US" b="1" dirty="0" err="1" smtClean="0"/>
-              <a:t>eg</a:t>
-            </a:r>
-            <a:r>
-              <a:rPr lang="en-US" b="1" dirty="0" smtClean="0"/>
+              <a:t>reg</a:t>
+            </a:r>
+            <a:r>
+              <a:rPr lang="en-US" b="1" dirty="0"/>
               <a:t> layer: </a:t>
             </a:r>
             <a:r>
-              <a:rPr lang="en-US" dirty="0" smtClean="0"/>
+              <a:rPr lang="en-US" dirty="0"/>
               <a:t>Regression layer outputs 4 numbers  (</a:t>
             </a:r>
             <a:r>
-              <a:rPr lang="en-US" dirty="0" err="1" smtClean="0"/>
+              <a:rPr lang="en-US" dirty="0" err="1"/>
               <a:t>x,y</a:t>
             </a:r>
             <a:r>
-              <a:rPr lang="en-US" dirty="0" smtClean="0"/>
+              <a:rPr lang="en-US" dirty="0"/>
               <a:t>, H,W).  </a:t>
             </a:r>
           </a:p>
           <a:p>
             <a:r>
-              <a:rPr lang="en-US" dirty="0" smtClean="0"/>
+              <a:rPr lang="en-US" dirty="0"/>
               <a:t> These are </a:t>
             </a:r>
             <a:r>
-              <a:rPr lang="en-US" dirty="0" err="1" smtClean="0"/>
+              <a:rPr lang="en-US" dirty="0" err="1"/>
               <a:t>wrt</a:t>
             </a:r>
             <a:r>
-              <a:rPr lang="en-US" dirty="0" smtClean="0"/>
+              <a:rPr lang="en-US" dirty="0"/>
               <a:t> the Input Image. (</a:t>
             </a:r>
             <a:r>
-              <a:rPr lang="en-US" dirty="0" err="1" smtClean="0"/>
+              <a:rPr lang="en-US" dirty="0" err="1"/>
               <a:t>x,y</a:t>
             </a:r>
             <a:r>
-              <a:rPr lang="en-US" dirty="0" smtClean="0"/>
+              <a:rPr lang="en-US" dirty="0"/>
               <a:t>) are the center of the Anchor Box. </a:t>
             </a:r>
             <a:endParaRPr lang="en-US" b="1" dirty="0"/>
@@ -4113,71 +4071,61 @@
           <a:lstStyle/>
           <a:p>
             <a:r>
-              <a:rPr lang="en-US" dirty="0" smtClean="0"/>
-              <a:t>We use k=9  </a:t>
-            </a:r>
-            <a:r>
-              <a:rPr lang="en-US" dirty="0"/>
-              <a:t>A</a:t>
-            </a:r>
-            <a:r>
-              <a:rPr lang="en-US" dirty="0" smtClean="0"/>
-              <a:t>nchor Boxes.</a:t>
-            </a:r>
-          </a:p>
-          <a:p>
-            <a:endParaRPr lang="en-US" dirty="0" smtClean="0"/>
-          </a:p>
-          <a:p>
-            <a:r>
-              <a:rPr lang="en-US" dirty="0" smtClean="0"/>
+              <a:rPr lang="en-US" dirty="0"/>
+              <a:t>We use k=9  Anchor Boxes.</a:t>
+            </a:r>
+          </a:p>
+          <a:p>
+            <a:endParaRPr lang="en-US" dirty="0"/>
+          </a:p>
+          <a:p>
+            <a:r>
+              <a:rPr lang="en-US" dirty="0"/>
               <a:t>256-d:  the Channels</a:t>
             </a:r>
+          </a:p>
+          <a:p>
+            <a:r>
+              <a:rPr lang="en-US" dirty="0" err="1"/>
+              <a:t>cls</a:t>
+            </a:r>
+            <a:r>
+              <a:rPr lang="en-US" dirty="0"/>
+              <a:t> : 2k  each anchor box will</a:t>
+            </a:r>
+          </a:p>
+          <a:p>
+            <a:r>
+              <a:rPr lang="en-US" dirty="0"/>
+              <a:t>Have 2 prediction.</a:t>
+            </a:r>
+          </a:p>
+          <a:p>
             <a:endParaRPr lang="en-US" dirty="0"/>
           </a:p>
           <a:p>
             <a:r>
-              <a:rPr lang="en-US" dirty="0" err="1" smtClean="0"/>
-              <a:t>cls</a:t>
-            </a:r>
-            <a:r>
-              <a:rPr lang="en-US" dirty="0" smtClean="0"/>
-              <a:t> : 2k  each anchor box will</a:t>
-            </a:r>
-          </a:p>
-          <a:p>
-            <a:r>
-              <a:rPr lang="en-US" dirty="0" smtClean="0"/>
-              <a:t>Have 2 prediction.</a:t>
-            </a:r>
-          </a:p>
-          <a:p>
-            <a:endParaRPr lang="en-US" dirty="0"/>
-          </a:p>
-          <a:p>
-            <a:r>
-              <a:rPr lang="en-US" dirty="0" err="1" smtClean="0"/>
+              <a:rPr lang="en-US" dirty="0" err="1"/>
               <a:t>Reg</a:t>
             </a:r>
             <a:r>
-              <a:rPr lang="en-US" dirty="0" smtClean="0"/>
+              <a:rPr lang="en-US" dirty="0"/>
               <a:t> 4k each anchor box will </a:t>
             </a:r>
           </a:p>
           <a:p>
             <a:r>
-              <a:rPr lang="en-US" dirty="0" smtClean="0"/>
+              <a:rPr lang="en-US" dirty="0"/>
               <a:t>Have 4 numbers (</a:t>
             </a:r>
             <a:r>
-              <a:rPr lang="en-US" dirty="0" err="1" smtClean="0"/>
+              <a:rPr lang="en-US" dirty="0" err="1"/>
               <a:t>x,y,h,w</a:t>
             </a:r>
             <a:r>
-              <a:rPr lang="en-US" dirty="0" smtClean="0"/>
+              <a:rPr lang="en-US" dirty="0"/>
               <a:t>).</a:t>
             </a:r>
-            <a:endParaRPr lang="en-US" dirty="0"/>
           </a:p>
         </p:txBody>
       </p:sp>
@@ -4232,24 +4180,24 @@
           <a:lstStyle/>
           <a:p>
             <a:r>
-              <a:rPr lang="en-US" dirty="0" smtClean="0"/>
+              <a:rPr lang="en-US" dirty="0"/>
               <a:t>If an anchor box has an “</a:t>
             </a:r>
             <a:r>
-              <a:rPr lang="en-US" dirty="0" err="1" smtClean="0"/>
+              <a:rPr lang="en-US" dirty="0" err="1"/>
               <a:t>objectness</a:t>
             </a:r>
             <a:r>
-              <a:rPr lang="en-US" dirty="0" smtClean="0"/>
+              <a:rPr lang="en-US" dirty="0"/>
               <a:t>” score above a certain threshold, that box’s coordinates get passed forward as a region proposal.</a:t>
             </a:r>
           </a:p>
           <a:p>
-            <a:endParaRPr lang="en-US" dirty="0" smtClean="0"/>
-          </a:p>
-          <a:p>
-            <a:r>
-              <a:rPr lang="en-US" dirty="0" smtClean="0"/>
+            <a:endParaRPr lang="en-US" dirty="0"/>
+          </a:p>
+          <a:p>
+            <a:r>
+              <a:rPr lang="en-US" dirty="0"/>
               <a:t>Once we have our region proposals, we feed them straight into what is essentially a Fast R-CNN. </a:t>
             </a:r>
           </a:p>
@@ -4368,11 +4316,7 @@
             </a:r>
             <a:r>
               <a:rPr lang="en-US" b="1" dirty="0"/>
-              <a:t> </a:t>
-            </a:r>
-            <a:r>
-              <a:rPr lang="en-US" b="1" dirty="0" smtClean="0"/>
-              <a:t>Pooling</a:t>
+              <a:t> Pooling</a:t>
             </a:r>
           </a:p>
           <a:p>
@@ -4391,23 +4335,18 @@
               <a:rPr lang="en-US" dirty="0"/>
               <a:t> Pooling layer is responsible for collecting the proposal and calculating the proposal feature maps for delivery to the subsequent network. </a:t>
             </a:r>
-            <a:endParaRPr lang="en-US" dirty="0" smtClean="0"/>
           </a:p>
           <a:p>
             <a:endParaRPr lang="en-US" dirty="0"/>
           </a:p>
           <a:p>
             <a:r>
-              <a:rPr lang="en-US" dirty="0" smtClean="0"/>
-              <a:t>Roll </a:t>
-            </a:r>
-            <a:r>
-              <a:rPr lang="en-US" dirty="0"/>
-              <a:t>pooling layer has 2 inputs:</a:t>
-            </a:r>
-          </a:p>
-          <a:p>
-            <a:endParaRPr lang="en-US" dirty="0" smtClean="0"/>
+              <a:rPr lang="en-US" dirty="0"/>
+              <a:t>Roll pooling layer has 2 inputs:</a:t>
+            </a:r>
+          </a:p>
+          <a:p>
+            <a:endParaRPr lang="en-US" dirty="0"/>
           </a:p>
           <a:p>
             <a:pPr marL="285750" indent="-285750">
@@ -4415,12 +4354,8 @@
               <a:buChar char="•"/>
             </a:pPr>
             <a:r>
-              <a:rPr lang="en-US" dirty="0" smtClean="0"/>
-              <a:t>Original </a:t>
-            </a:r>
-            <a:r>
-              <a:rPr lang="en-US" dirty="0"/>
-              <a:t>feature maps</a:t>
+              <a:rPr lang="en-US" dirty="0"/>
+              <a:t>Original feature maps</a:t>
             </a:r>
           </a:p>
           <a:p>
@@ -4434,14 +4369,10 @@
             </a:r>
           </a:p>
           <a:p>
-            <a:r>
-              <a:rPr lang="en-US" dirty="0" smtClean="0"/>
-              <a:t/>
-            </a:r>
             <a:br>
-              <a:rPr lang="en-US" dirty="0" smtClean="0"/>
+              <a:rPr lang="en-US" dirty="0"/>
             </a:br>
-            <a:endParaRPr lang="en-US" b="1" dirty="0" smtClean="0"/>
+            <a:endParaRPr lang="en-US" b="1" dirty="0"/>
           </a:p>
           <a:p>
             <a:endParaRPr lang="en-US" b="1" dirty="0"/>
@@ -4556,7 +4487,7 @@
           <a:lstStyle/>
           <a:p>
             <a:r>
-              <a:rPr lang="en-US" b="1" dirty="0" smtClean="0"/>
+              <a:rPr lang="en-US" b="1" dirty="0"/>
               <a:t>Classification:</a:t>
             </a:r>
           </a:p>
@@ -4569,28 +4500,23 @@
               <a:buChar char="•"/>
             </a:pPr>
             <a:r>
-              <a:rPr lang="en-US" dirty="0" smtClean="0"/>
-              <a:t>Classification </a:t>
-            </a:r>
-            <a:r>
-              <a:rPr lang="en-US" dirty="0"/>
-              <a:t>of proposals by full connection and </a:t>
-            </a:r>
-            <a:r>
-              <a:rPr lang="en-US" dirty="0" err="1" smtClean="0"/>
+              <a:rPr lang="en-US" dirty="0"/>
+              <a:t>Classification of proposals by full connection and </a:t>
+            </a:r>
+            <a:r>
+              <a:rPr lang="en-US" dirty="0" err="1"/>
               <a:t>softmax</a:t>
             </a:r>
             <a:r>
-              <a:rPr lang="en-US" dirty="0" smtClean="0"/>
+              <a:rPr lang="en-US" dirty="0"/>
               <a:t>, to get Class probability.</a:t>
             </a:r>
           </a:p>
           <a:p>
             <a:r>
-              <a:rPr lang="en-US" dirty="0" smtClean="0"/>
+              <a:rPr lang="en-US" dirty="0"/>
               <a:t>  </a:t>
             </a:r>
-            <a:endParaRPr lang="en-US" dirty="0"/>
           </a:p>
           <a:p>
             <a:pPr marL="285750" indent="-285750">
@@ -4599,24 +4525,11 @@
             </a:pPr>
             <a:r>
               <a:rPr lang="en-US" dirty="0"/>
-              <a:t>B</a:t>
-            </a:r>
-            <a:r>
-              <a:rPr lang="en-US" dirty="0" smtClean="0"/>
-              <a:t>ounding Box </a:t>
-            </a:r>
-            <a:r>
-              <a:rPr lang="en-US" dirty="0"/>
-              <a:t>regression on proposals to get a higher </a:t>
-            </a:r>
-            <a:r>
-              <a:rPr lang="en-US" dirty="0" smtClean="0"/>
-              <a:t>precision.  </a:t>
-            </a:r>
-            <a:endParaRPr lang="en-US" dirty="0"/>
-          </a:p>
-          <a:p>
-            <a:endParaRPr lang="en-US" b="1" dirty="0" smtClean="0"/>
+              <a:t>Bounding Box regression on proposals to get a higher precision.  </a:t>
+            </a:r>
+          </a:p>
+          <a:p>
+            <a:endParaRPr lang="en-US" b="1" dirty="0"/>
           </a:p>
           <a:p>
             <a:endParaRPr lang="en-US" b="1" dirty="0"/>
@@ -4723,10 +4636,9 @@
           <a:lstStyle/>
           <a:p>
             <a:r>
-              <a:rPr lang="en-US" b="1" dirty="0" smtClean="0"/>
+              <a:rPr lang="en-US" b="1" dirty="0"/>
               <a:t>Next Topics</a:t>
             </a:r>
-            <a:endParaRPr lang="en-US" b="1" dirty="0"/>
           </a:p>
         </p:txBody>
       </p:sp>
@@ -4740,10 +4652,15 @@
             <p:ph type="subTitle"/>
           </p:nvPr>
         </p:nvSpPr>
-        <p:spPr/>
+        <p:spPr>
+          <a:xfrm>
+            <a:off x="457200" y="1676400"/>
+            <a:ext cx="8229240" cy="1144800"/>
+          </a:xfrm>
+        </p:spPr>
         <p:txBody>
           <a:bodyPr>
-            <a:normAutofit/>
+            <a:normAutofit fontScale="70000" lnSpcReduction="20000"/>
           </a:bodyPr>
           <a:lstStyle/>
           <a:p>
@@ -4752,7 +4669,7 @@
               <a:buChar char="•"/>
             </a:pPr>
             <a:r>
-              <a:rPr lang="en-US" sz="2400" dirty="0" smtClean="0"/>
+              <a:rPr lang="en-US" sz="2400" dirty="0"/>
               <a:t>Mask R-CNN</a:t>
             </a:r>
           </a:p>
@@ -4769,7 +4686,7 @@
               <a:buChar char="•"/>
             </a:pPr>
             <a:r>
-              <a:rPr lang="en-US" sz="2400" dirty="0" smtClean="0"/>
+              <a:rPr lang="en-US" sz="2400" dirty="0"/>
               <a:t>YOLO</a:t>
             </a:r>
           </a:p>
@@ -4786,10 +4703,9 @@
               <a:buChar char="•"/>
             </a:pPr>
             <a:r>
-              <a:rPr lang="en-US" sz="2400" dirty="0" smtClean="0"/>
+              <a:rPr lang="en-US" sz="2400" dirty="0"/>
               <a:t>U-Nets</a:t>
             </a:r>
-            <a:endParaRPr lang="en-US" sz="2400" dirty="0"/>
           </a:p>
         </p:txBody>
       </p:sp>
@@ -5043,25 +4959,9 @@
                 <a:ea typeface="DejaVu Sans"/>
                 <a:hlinkClick r:id="rId3"/>
               </a:rPr>
-              <a:t>https://</a:t>
-            </a:r>
-            <a:r>
-              <a:rPr lang="en-US" sz="1500" b="0" strike="noStrike" spc="-1" dirty="0" smtClean="0">
-                <a:solidFill>
-                  <a:srgbClr val="000000"/>
-                </a:solidFill>
-                <a:uFill>
-                  <a:solidFill>
-                    <a:srgbClr val="FFFFFF"/>
-                  </a:solidFill>
-                </a:uFill>
-                <a:latin typeface="Arial"/>
-                <a:ea typeface="DejaVu Sans"/>
-                <a:hlinkClick r:id="rId3"/>
-              </a:rPr>
-              <a:t>www.linkedin.com/in/aliasgertalib</a:t>
-            </a:r>
-            <a:endParaRPr lang="en-US" sz="1500" b="0" strike="noStrike" spc="-1" dirty="0" smtClean="0">
+              <a:t>https://www.linkedin.com/in/aliasgertalib</a:t>
+            </a:r>
+            <a:endParaRPr lang="en-US" sz="1500" b="0" strike="noStrike" spc="-1" dirty="0">
               <a:solidFill>
                 <a:srgbClr val="000000"/>
               </a:solidFill>
@@ -5080,7 +4980,7 @@
                 <a:spcPct val="100000"/>
               </a:lnSpc>
             </a:pPr>
-            <a:endParaRPr lang="en-US" sz="1500" spc="-1" dirty="0" smtClean="0">
+            <a:endParaRPr lang="en-US" sz="1500" spc="-1" dirty="0">
               <a:solidFill>
                 <a:srgbClr val="000000"/>
               </a:solidFill>
@@ -5099,7 +4999,7 @@
               </a:lnSpc>
             </a:pPr>
             <a:r>
-              <a:rPr lang="en-US" sz="1500" spc="-1" dirty="0" smtClean="0">
+              <a:rPr lang="en-US" sz="1500" spc="-1" dirty="0">
                 <a:solidFill>
                   <a:srgbClr val="000000"/>
                 </a:solidFill>
@@ -5112,17 +5012,6 @@
               </a:rPr>
               <a:t>GitHub</a:t>
             </a:r>
-            <a:endParaRPr lang="en-US" sz="1500" spc="-1" dirty="0">
-              <a:solidFill>
-                <a:srgbClr val="000000"/>
-              </a:solidFill>
-              <a:uFill>
-                <a:solidFill>
-                  <a:srgbClr val="FFFFFF"/>
-                </a:solidFill>
-              </a:uFill>
-              <a:latin typeface="Arial"/>
-            </a:endParaRPr>
           </a:p>
           <a:p>
             <a:pPr>
@@ -5235,10 +5124,9 @@
           <a:lstStyle/>
           <a:p>
             <a:r>
-              <a:rPr lang="en-US" sz="2400" b="1" dirty="0" smtClean="0"/>
+              <a:rPr lang="en-US" sz="2400" b="1" dirty="0"/>
               <a:t>References</a:t>
             </a:r>
-            <a:endParaRPr lang="en-US" sz="2400" b="1" dirty="0"/>
           </a:p>
         </p:txBody>
       </p:sp>
@@ -5265,12 +5153,8 @@
           <a:lstStyle/>
           <a:p>
             <a:r>
-              <a:rPr lang="en-US" dirty="0" smtClean="0"/>
-              <a:t> R-CNN </a:t>
-            </a:r>
-            <a:r>
-              <a:rPr lang="en-US" dirty="0"/>
-              <a:t>model </a:t>
+              <a:rPr lang="en-US" dirty="0"/>
+              <a:t> R-CNN model </a:t>
             </a:r>
             <a:r>
               <a:rPr lang="en-US" dirty="0">
@@ -5288,19 +5172,13 @@
               <a:rPr lang="en-US" dirty="0">
                 <a:hlinkClick r:id="rId2"/>
               </a:rPr>
-              <a:t> et al., 2014</a:t>
-            </a:r>
-            <a:r>
-              <a:rPr lang="en-US" dirty="0" smtClean="0">
-                <a:hlinkClick r:id="rId2"/>
-              </a:rPr>
-              <a:t>)</a:t>
-            </a:r>
-            <a:endParaRPr lang="en-US" dirty="0" smtClean="0"/>
-          </a:p>
-          <a:p>
-            <a:r>
-              <a:rPr lang="en-US" dirty="0" smtClean="0"/>
+              <a:t> et al., 2014)</a:t>
+            </a:r>
+            <a:endParaRPr lang="en-US" dirty="0"/>
+          </a:p>
+          <a:p>
+            <a:r>
+              <a:rPr lang="en-US" dirty="0"/>
               <a:t> FAST R-CNN   </a:t>
             </a:r>
             <a:r>
@@ -5319,84 +5197,52 @@
               <a:rPr lang="en-US" dirty="0">
                 <a:hlinkClick r:id="rId3"/>
               </a:rPr>
-              <a:t> (2015</a:t>
-            </a:r>
-            <a:r>
-              <a:rPr lang="en-US" dirty="0" smtClean="0">
-                <a:hlinkClick r:id="rId3"/>
-              </a:rPr>
-              <a:t>)</a:t>
-            </a:r>
-            <a:endParaRPr lang="en-US" dirty="0" smtClean="0"/>
-          </a:p>
-          <a:p>
-            <a:r>
-              <a:rPr lang="en-US" dirty="0" smtClean="0"/>
-              <a:t> FASTER R-CNN  </a:t>
-            </a:r>
-            <a:r>
-              <a:rPr lang="en-US" dirty="0"/>
-              <a:t> </a:t>
+              <a:t> (2015)</a:t>
+            </a:r>
+            <a:endParaRPr lang="en-US" dirty="0"/>
+          </a:p>
+          <a:p>
+            <a:r>
+              <a:rPr lang="en-US" dirty="0"/>
+              <a:t> FASTER R-CNN   </a:t>
             </a:r>
             <a:r>
               <a:rPr lang="en-US" dirty="0">
                 <a:hlinkClick r:id="rId4"/>
               </a:rPr>
-              <a:t>S. Ren and al. (2016</a:t>
-            </a:r>
-            <a:r>
-              <a:rPr lang="en-US" dirty="0" smtClean="0">
-                <a:hlinkClick r:id="rId4"/>
-              </a:rPr>
-              <a:t>)</a:t>
-            </a:r>
-            <a:endParaRPr lang="en-US" dirty="0" smtClean="0"/>
-          </a:p>
-          <a:p>
-            <a:r>
-              <a:rPr lang="en-US" dirty="0"/>
-              <a:t> </a:t>
-            </a:r>
-            <a:r>
-              <a:rPr lang="en-US" dirty="0" smtClean="0"/>
-              <a:t>R-FCN </a:t>
+              <a:t>S. Ren and al. (2016)</a:t>
+            </a:r>
+            <a:endParaRPr lang="en-US" dirty="0"/>
+          </a:p>
+          <a:p>
+            <a:r>
+              <a:rPr lang="en-US" dirty="0"/>
+              <a:t> R-FCN </a:t>
             </a:r>
             <a:r>
               <a:rPr lang="it-IT" dirty="0">
                 <a:hlinkClick r:id="rId5"/>
               </a:rPr>
-              <a:t>J. Dai and al. (2016</a:t>
-            </a:r>
-            <a:r>
-              <a:rPr lang="it-IT" dirty="0" smtClean="0">
-                <a:hlinkClick r:id="rId5"/>
-              </a:rPr>
-              <a:t>)</a:t>
-            </a:r>
-            <a:endParaRPr lang="it-IT" dirty="0" smtClean="0"/>
-          </a:p>
-          <a:p>
-            <a:r>
-              <a:rPr lang="it-IT" dirty="0" smtClean="0"/>
+              <a:t>J. Dai and al. (2016)</a:t>
+            </a:r>
+            <a:endParaRPr lang="it-IT" dirty="0"/>
+          </a:p>
+          <a:p>
+            <a:r>
+              <a:rPr lang="it-IT" dirty="0"/>
               <a:t> YOLO </a:t>
             </a:r>
             <a:r>
               <a:rPr lang="da-DK" dirty="0">
                 <a:hlinkClick r:id="rId6"/>
               </a:rPr>
-              <a:t>(J. Redmon et al., 2016</a:t>
-            </a:r>
-            <a:r>
-              <a:rPr lang="da-DK" dirty="0" smtClean="0">
-                <a:hlinkClick r:id="rId6"/>
-              </a:rPr>
-              <a:t>)</a:t>
-            </a:r>
-            <a:endParaRPr lang="da-DK" dirty="0" smtClean="0"/>
-          </a:p>
-          <a:p>
-            <a:r>
-              <a:rPr lang="en-US" dirty="0" smtClean="0"/>
+              <a:t>(J. Redmon et al., 2016)</a:t>
+            </a:r>
+            <a:endParaRPr lang="da-DK" dirty="0"/>
+          </a:p>
+          <a:p>
+            <a:r>
+              <a:rPr lang="en-US" dirty="0"/>
               <a:t> SSD </a:t>
             </a:r>
             <a:r>
@@ -5409,11 +5255,10 @@
               <a:rPr lang="da-DK" dirty="0"/>
               <a:t> </a:t>
             </a:r>
-            <a:endParaRPr lang="da-DK" dirty="0" smtClean="0"/>
-          </a:p>
-          <a:p>
-            <a:r>
-              <a:rPr lang="da-DK" dirty="0" smtClean="0"/>
+          </a:p>
+          <a:p>
+            <a:r>
+              <a:rPr lang="da-DK" dirty="0"/>
               <a:t> YOLO9000 </a:t>
             </a:r>
             <a:r>
@@ -5444,37 +5289,31 @@
               <a:rPr lang="en-US" dirty="0">
                 <a:hlinkClick r:id="rId8"/>
               </a:rPr>
-              <a:t> (2016</a:t>
-            </a:r>
-            <a:r>
-              <a:rPr lang="en-US" dirty="0" smtClean="0">
-                <a:hlinkClick r:id="rId8"/>
-              </a:rPr>
-              <a:t>)</a:t>
-            </a:r>
-            <a:r>
-              <a:rPr lang="en-US" dirty="0" smtClean="0"/>
+              <a:t> (2016)</a:t>
+            </a:r>
+            <a:r>
+              <a:rPr lang="en-US" dirty="0"/>
               <a:t>  (</a:t>
             </a:r>
             <a:r>
-              <a:rPr lang="en-US" dirty="0" smtClean="0">
+              <a:rPr lang="en-US" dirty="0">
                 <a:hlinkClick r:id="rId9"/>
               </a:rPr>
               <a:t>https://pjreddie.com/darknet/yolo/)</a:t>
             </a:r>
-            <a:endParaRPr lang="en-US" dirty="0" smtClean="0"/>
-          </a:p>
-          <a:p>
-            <a:r>
-              <a:rPr lang="en-US" dirty="0" smtClean="0"/>
+            <a:endParaRPr lang="en-US" dirty="0"/>
+          </a:p>
+          <a:p>
+            <a:r>
+              <a:rPr lang="en-US" dirty="0"/>
               <a:t> </a:t>
             </a:r>
             <a:r>
-              <a:rPr lang="en-US" dirty="0" err="1" smtClean="0"/>
+              <a:rPr lang="en-US" dirty="0" err="1"/>
               <a:t>NASNet</a:t>
             </a:r>
             <a:r>
-              <a:rPr lang="en-US" dirty="0" smtClean="0"/>
+              <a:rPr lang="en-US" dirty="0"/>
               <a:t> </a:t>
             </a:r>
             <a:r>
@@ -5499,189 +5338,176 @@
               <a:rPr lang="en-US" dirty="0"/>
               <a:t> </a:t>
             </a:r>
-            <a:endParaRPr lang="en-US" dirty="0" smtClean="0"/>
-          </a:p>
-          <a:p>
-            <a:r>
-              <a:rPr lang="en-US" dirty="0" smtClean="0"/>
+          </a:p>
+          <a:p>
+            <a:r>
+              <a:rPr lang="en-US" dirty="0"/>
               <a:t>Mask R-CNN </a:t>
             </a:r>
             <a:r>
               <a:rPr lang="en-US" dirty="0">
                 <a:hlinkClick r:id="rId11"/>
               </a:rPr>
-              <a:t>K. He and al. (2017</a:t>
-            </a:r>
-            <a:r>
-              <a:rPr lang="en-US" dirty="0" smtClean="0">
-                <a:hlinkClick r:id="rId11"/>
-              </a:rPr>
-              <a:t>)</a:t>
-            </a:r>
-            <a:endParaRPr lang="en-US" dirty="0" smtClean="0"/>
-          </a:p>
-          <a:p>
-            <a:endParaRPr lang="en-US" dirty="0" smtClean="0"/>
-          </a:p>
-          <a:p>
-            <a:r>
-              <a:rPr lang="en-US" dirty="0" err="1" smtClean="0">
+              <a:t>K. He and al. (2017)</a:t>
+            </a:r>
+            <a:endParaRPr lang="en-US" dirty="0"/>
+          </a:p>
+          <a:p>
+            <a:endParaRPr lang="en-US" dirty="0"/>
+          </a:p>
+          <a:p>
+            <a:r>
+              <a:rPr lang="en-US" dirty="0" err="1">
                 <a:hlinkClick r:id="rId12"/>
               </a:rPr>
               <a:t>Jaccards</a:t>
             </a:r>
             <a:r>
-              <a:rPr lang="en-US" dirty="0" smtClean="0">
+              <a:rPr lang="en-US" dirty="0">
                 <a:hlinkClick r:id="rId12"/>
               </a:rPr>
               <a:t> Index</a:t>
             </a:r>
-            <a:endParaRPr lang="en-US" dirty="0" smtClean="0"/>
-          </a:p>
-          <a:p>
             <a:endParaRPr lang="en-US" dirty="0"/>
           </a:p>
           <a:p>
-            <a:r>
-              <a:rPr lang="en-US" dirty="0" smtClean="0">
+            <a:endParaRPr lang="en-US" dirty="0"/>
+          </a:p>
+          <a:p>
+            <a:r>
+              <a:rPr lang="en-US" dirty="0">
                 <a:hlinkClick r:id="rId13"/>
               </a:rPr>
               <a:t>Model Comparisons </a:t>
             </a:r>
-            <a:endParaRPr lang="en-US" dirty="0" smtClean="0"/>
-          </a:p>
-          <a:p>
-            <a:r>
-              <a:rPr lang="en-US" dirty="0" smtClean="0">
+            <a:endParaRPr lang="en-US" dirty="0"/>
+          </a:p>
+          <a:p>
+            <a:r>
+              <a:rPr lang="en-US" dirty="0">
                 <a:hlinkClick r:id="rId14"/>
               </a:rPr>
               <a:t>Model Comparisons</a:t>
             </a:r>
-            <a:endParaRPr lang="en-US" dirty="0" smtClean="0"/>
-          </a:p>
-          <a:p>
             <a:endParaRPr lang="en-US" dirty="0"/>
           </a:p>
           <a:p>
-            <a:r>
-              <a:rPr lang="en-US" dirty="0" smtClean="0">
+            <a:endParaRPr lang="en-US" dirty="0"/>
+          </a:p>
+          <a:p>
+            <a:r>
+              <a:rPr lang="en-US" dirty="0">
                 <a:hlinkClick r:id="rId15"/>
               </a:rPr>
               <a:t>TimeLine</a:t>
             </a:r>
-            <a:endParaRPr lang="en-US" dirty="0" smtClean="0"/>
-          </a:p>
-          <a:p>
-            <a:r>
-              <a:rPr lang="en-US" dirty="0" smtClean="0">
+            <a:endParaRPr lang="en-US" dirty="0"/>
+          </a:p>
+          <a:p>
+            <a:r>
+              <a:rPr lang="en-US" dirty="0">
                 <a:hlinkClick r:id="rId16"/>
               </a:rPr>
               <a:t>Object Detection Techniques</a:t>
             </a:r>
-            <a:endParaRPr lang="en-US" dirty="0" smtClean="0"/>
-          </a:p>
-          <a:p>
-            <a:endParaRPr lang="en-US" dirty="0" smtClean="0"/>
-          </a:p>
-          <a:p>
-            <a:r>
-              <a:rPr lang="en-US" dirty="0" smtClean="0">
+            <a:endParaRPr lang="en-US" dirty="0"/>
+          </a:p>
+          <a:p>
+            <a:endParaRPr lang="en-US" dirty="0"/>
+          </a:p>
+          <a:p>
+            <a:r>
+              <a:rPr lang="en-US" dirty="0">
                 <a:hlinkClick r:id="rId17"/>
               </a:rPr>
               <a:t>https://towardsdatascience.com/deep-learning-for-object-detection-a-comprehensive-review-73930816d8d9</a:t>
             </a:r>
-            <a:endParaRPr lang="en-US" dirty="0" smtClean="0"/>
-          </a:p>
-          <a:p>
             <a:endParaRPr lang="en-US" dirty="0"/>
           </a:p>
           <a:p>
-            <a:r>
-              <a:rPr lang="en-US" dirty="0" smtClean="0">
+            <a:endParaRPr lang="en-US" dirty="0"/>
+          </a:p>
+          <a:p>
+            <a:r>
+              <a:rPr lang="en-US" dirty="0">
                 <a:hlinkClick r:id="rId18"/>
               </a:rPr>
               <a:t>https://medium.com/@timothycarlen/understanding-the-map-evaluation-metric-for-object-detection-a07fe6962cf3</a:t>
             </a:r>
-            <a:endParaRPr lang="en-US" dirty="0" smtClean="0"/>
-          </a:p>
-          <a:p>
-            <a:r>
-              <a:rPr lang="en-US" dirty="0" smtClean="0"/>
+            <a:endParaRPr lang="en-US" dirty="0"/>
+          </a:p>
+          <a:p>
+            <a:r>
+              <a:rPr lang="en-US" dirty="0"/>
               <a:t> </a:t>
             </a:r>
             <a:r>
-              <a:rPr lang="en-US" dirty="0" smtClean="0">
+              <a:rPr lang="en-US" dirty="0">
                 <a:hlinkClick r:id="rId19"/>
               </a:rPr>
               <a:t>https://deepsense.ai/region-of-interest-pooling-explained/</a:t>
             </a:r>
-            <a:endParaRPr lang="en-US" dirty="0" smtClean="0"/>
-          </a:p>
-          <a:p>
-            <a:r>
-              <a:rPr lang="en-US" dirty="0" smtClean="0">
+            <a:endParaRPr lang="en-US" dirty="0"/>
+          </a:p>
+          <a:p>
+            <a:r>
+              <a:rPr lang="en-US" dirty="0">
                 <a:hlinkClick r:id="rId20"/>
               </a:rPr>
               <a:t>https://medium.com/nanonets/how-to-do-image-segmentation-using-deep-learning-c673cc5862ef</a:t>
             </a:r>
-            <a:endParaRPr lang="en-US" dirty="0" smtClean="0"/>
-          </a:p>
-          <a:p>
-            <a:endParaRPr lang="en-US" dirty="0" smtClean="0"/>
-          </a:p>
-          <a:p>
-            <a:r>
-              <a:rPr lang="en-US" dirty="0" smtClean="0">
+            <a:endParaRPr lang="en-US" dirty="0"/>
+          </a:p>
+          <a:p>
+            <a:endParaRPr lang="en-US" dirty="0"/>
+          </a:p>
+          <a:p>
+            <a:r>
+              <a:rPr lang="en-US" dirty="0">
                 <a:hlinkClick r:id="rId21"/>
               </a:rPr>
               <a:t>https://medium.com/nanonets/how-to-automate-surveillance-easily-with-deep-learning-4eb4fa0cd68d</a:t>
             </a:r>
-            <a:endParaRPr lang="en-US" dirty="0" smtClean="0"/>
-          </a:p>
-          <a:p>
-            <a:r>
-              <a:rPr lang="en-US" dirty="0" smtClean="0">
+            <a:endParaRPr lang="en-US" dirty="0"/>
+          </a:p>
+          <a:p>
+            <a:r>
+              <a:rPr lang="en-US" dirty="0">
                 <a:hlinkClick r:id="rId22"/>
               </a:rPr>
               <a:t>https://towardsdatascience.com/semantic-segmentation-with-deep-learning-a-guide-and-code-e52fc8958823</a:t>
             </a:r>
-            <a:endParaRPr lang="en-US" dirty="0" smtClean="0"/>
-          </a:p>
-          <a:p>
-            <a:r>
-              <a:rPr lang="en-US" dirty="0" smtClean="0">
+            <a:endParaRPr lang="en-US" dirty="0"/>
+          </a:p>
+          <a:p>
+            <a:r>
+              <a:rPr lang="en-US" dirty="0">
                 <a:hlinkClick r:id="rId23"/>
               </a:rPr>
-              <a:t>https://thegradient.pub/semantic-segmentation</a:t>
-            </a:r>
-            <a:r>
-              <a:rPr lang="en-US" dirty="0" smtClean="0">
-                <a:hlinkClick r:id="rId23"/>
-              </a:rPr>
-              <a:t>/</a:t>
-            </a:r>
-            <a:endParaRPr lang="en-US" dirty="0" smtClean="0"/>
-          </a:p>
-          <a:p>
+              <a:t>https://thegradient.pub/semantic-segmentation/</a:t>
+            </a:r>
             <a:endParaRPr lang="en-US" dirty="0"/>
           </a:p>
           <a:p>
-            <a:r>
-              <a:rPr lang="en-US" dirty="0" smtClean="0">
+            <a:endParaRPr lang="en-US" dirty="0"/>
+          </a:p>
+          <a:p>
+            <a:r>
+              <a:rPr lang="en-US" dirty="0">
                 <a:hlinkClick r:id="rId24"/>
               </a:rPr>
               <a:t>https://www.youtube.com/watch?v=aDCXYRyb_vs</a:t>
             </a:r>
-            <a:endParaRPr lang="en-US" dirty="0" smtClean="0"/>
-          </a:p>
-          <a:p>
-            <a:r>
-              <a:rPr lang="en-US" dirty="0" smtClean="0">
+            <a:endParaRPr lang="en-US" dirty="0"/>
+          </a:p>
+          <a:p>
+            <a:r>
+              <a:rPr lang="en-US" dirty="0">
                 <a:hlinkClick r:id="rId25"/>
               </a:rPr>
               <a:t>https://zhuanlan.zhihu.com/p/31426458</a:t>
             </a:r>
-            <a:endParaRPr lang="en-US" dirty="0" smtClean="0"/>
+            <a:endParaRPr lang="en-US" dirty="0"/>
           </a:p>
         </p:txBody>
       </p:sp>
@@ -5695,13 +5521,6 @@
   <p:clrMapOvr>
     <a:masterClrMapping/>
   </p:clrMapOvr>
-  <p:timing>
-    <p:tnLst>
-      <p:par>
-        <p:cTn id="1" dur="indefinite" restart="never" nodeType="tmRoot"/>
-      </p:par>
-    </p:tnLst>
-  </p:timing>
 </p:sld>
 </file>
 
@@ -5808,7 +5627,7 @@
               <a:buChar char="•"/>
             </a:pPr>
             <a:r>
-              <a:rPr lang="en-US" sz="3200" spc="-1" dirty="0" smtClean="0">
+              <a:rPr lang="en-US" sz="3200" spc="-1" dirty="0">
                 <a:solidFill>
                   <a:srgbClr val="000000"/>
                 </a:solidFill>
@@ -5863,7 +5682,7 @@
               <a:buChar char="•"/>
             </a:pPr>
             <a:r>
-              <a:rPr lang="en-US" sz="3200" spc="-1" dirty="0" smtClean="0">
+              <a:rPr lang="en-US" sz="3200" spc="-1" dirty="0">
                 <a:solidFill>
                   <a:srgbClr val="000000"/>
                 </a:solidFill>
@@ -5876,17 +5695,6 @@
               </a:rPr>
               <a:t>Faster R-CNN</a:t>
             </a:r>
-            <a:endParaRPr lang="en-US" sz="3200" spc="-1" dirty="0" smtClean="0">
-              <a:solidFill>
-                <a:srgbClr val="000000"/>
-              </a:solidFill>
-              <a:uFill>
-                <a:solidFill>
-                  <a:srgbClr val="FFFFFF"/>
-                </a:solidFill>
-              </a:uFill>
-              <a:latin typeface="Calibri"/>
-            </a:endParaRPr>
           </a:p>
           <a:p>
             <a:pPr marL="343080" indent="-342720">
@@ -5929,7 +5737,7 @@
               <a:buChar char="•"/>
             </a:pPr>
             <a:r>
-              <a:rPr lang="en-US" sz="3200" b="0" strike="noStrike" spc="-1" dirty="0" smtClean="0">
+              <a:rPr lang="en-US" sz="3200" b="0" strike="noStrike" spc="-1" dirty="0">
                 <a:solidFill>
                   <a:srgbClr val="000000"/>
                 </a:solidFill>
@@ -5940,35 +5748,7 @@
                 </a:uFill>
                 <a:latin typeface="Calibri"/>
               </a:rPr>
-              <a:t> </a:t>
-            </a:r>
-            <a:r>
-              <a:rPr lang="en-US" sz="3200" b="0" strike="noStrike" spc="-1" dirty="0" smtClean="0">
-                <a:solidFill>
-                  <a:srgbClr val="000000"/>
-                </a:solidFill>
-                <a:uFill>
-                  <a:solidFill>
-                    <a:srgbClr val="FFFFFF"/>
-                  </a:solidFill>
-                </a:uFill>
-                <a:latin typeface="Calibri"/>
-              </a:rPr>
-              <a:t>Questions</a:t>
-            </a:r>
-            <a:r>
-              <a:rPr lang="en-US" sz="3200" b="0" strike="noStrike" spc="-1" dirty="0">
-                <a:solidFill>
-                  <a:srgbClr val="000000"/>
-                </a:solidFill>
-                <a:uFill>
-                  <a:solidFill>
-                    <a:srgbClr val="FFFFFF"/>
-                  </a:solidFill>
-                </a:uFill>
-                <a:latin typeface="Calibri"/>
-              </a:rPr>
-              <a:t>.</a:t>
+              <a:t> Questions.</a:t>
             </a:r>
           </a:p>
         </p:txBody>
@@ -6046,10 +5826,9 @@
           <a:lstStyle/>
           <a:p>
             <a:r>
-              <a:rPr lang="en-US" sz="2400" b="1" dirty="0" smtClean="0"/>
+              <a:rPr lang="en-US" sz="2400" b="1" dirty="0"/>
               <a:t>What is Segmentation ?</a:t>
             </a:r>
-            <a:endParaRPr lang="en-US" sz="2400" b="1" dirty="0"/>
           </a:p>
         </p:txBody>
       </p:sp>
@@ -6080,16 +5859,12 @@
               <a:buChar char="•"/>
             </a:pPr>
             <a:r>
-              <a:rPr lang="en-US" b="1" dirty="0" smtClean="0"/>
+              <a:rPr lang="en-US" b="1" dirty="0"/>
               <a:t>Segmentation:</a:t>
             </a:r>
             <a:r>
-              <a:rPr lang="en-US" dirty="0" smtClean="0"/>
-              <a:t> </a:t>
-            </a:r>
-            <a:r>
-              <a:rPr lang="en-US" dirty="0"/>
-              <a:t>is a partition of an image into several "coherent" parts, but </a:t>
+              <a:rPr lang="en-US" dirty="0"/>
+              <a:t> is a partition of an image into several "coherent" parts, but </a:t>
             </a:r>
             <a:r>
               <a:rPr lang="en-US" i="1" dirty="0"/>
@@ -6097,11 +5872,7 @@
             </a:r>
             <a:r>
               <a:rPr lang="en-US" dirty="0"/>
-              <a:t> any attempt at understanding what these parts represent</a:t>
-            </a:r>
-            <a:r>
-              <a:rPr lang="en-US" dirty="0" smtClean="0"/>
-              <a:t>. </a:t>
+              <a:t> any attempt at understanding what these parts represent. </a:t>
             </a:r>
           </a:p>
           <a:p>
@@ -6109,21 +5880,16 @@
               <a:buFont typeface="Arial" panose="020B0604020202020204" pitchFamily="34" charset="0"/>
               <a:buChar char="•"/>
             </a:pPr>
-            <a:endParaRPr lang="en-US" dirty="0" smtClean="0"/>
-          </a:p>
-          <a:p>
-            <a:r>
-              <a:rPr lang="en-US" dirty="0" smtClean="0"/>
-              <a:t>     Partitioning can be based on </a:t>
-            </a:r>
-            <a:r>
-              <a:rPr lang="en-US" dirty="0"/>
-              <a:t>low-level cues such as color, texture and smoothness of boundary. </a:t>
-            </a:r>
-            <a:endParaRPr lang="en-US" dirty="0" smtClean="0"/>
-          </a:p>
-          <a:p>
-            <a:endParaRPr lang="en-US" dirty="0" smtClean="0"/>
+            <a:endParaRPr lang="en-US" dirty="0"/>
+          </a:p>
+          <a:p>
+            <a:r>
+              <a:rPr lang="en-US" dirty="0"/>
+              <a:t>     Partitioning can be based on low-level cues such as color, texture and smoothness of boundary. </a:t>
+            </a:r>
+          </a:p>
+          <a:p>
+            <a:endParaRPr lang="en-US" dirty="0"/>
           </a:p>
           <a:p>
             <a:endParaRPr lang="en-US" dirty="0"/>
@@ -6134,20 +5900,12 @@
               <a:buChar char="•"/>
             </a:pPr>
             <a:r>
-              <a:rPr lang="en-US" b="1" dirty="0" smtClean="0"/>
-              <a:t>Semantic </a:t>
-            </a:r>
-            <a:r>
-              <a:rPr lang="en-US" b="1" dirty="0" smtClean="0"/>
-              <a:t>Segmentation:  (Pixel Level Classification) </a:t>
-            </a:r>
-            <a:r>
-              <a:rPr lang="en-US" dirty="0" smtClean="0"/>
-              <a:t> </a:t>
-            </a:r>
-            <a:r>
-              <a:rPr lang="en-US" dirty="0"/>
-              <a:t>attempts to partition the image into semantically meaningful parts, </a:t>
+              <a:rPr lang="en-US" b="1" dirty="0"/>
+              <a:t>Semantic Segmentation:  (Pixel Level Classification) </a:t>
+            </a:r>
+            <a:r>
+              <a:rPr lang="en-US" dirty="0"/>
+              <a:t> attempts to partition the image into semantically meaningful parts, </a:t>
             </a:r>
             <a:r>
               <a:rPr lang="en-US" i="1" dirty="0"/>
@@ -6155,11 +5913,7 @@
             </a:r>
             <a:r>
               <a:rPr lang="en-US" dirty="0"/>
-              <a:t> to classify each part into one of the pre-determined classes</a:t>
-            </a:r>
-            <a:r>
-              <a:rPr lang="en-US" dirty="0" smtClean="0"/>
-              <a:t>.</a:t>
+              <a:t> to classify each part into one of the pre-determined classes.</a:t>
             </a:r>
           </a:p>
           <a:p>
@@ -6175,21 +5929,16 @@
               <a:buChar char="•"/>
             </a:pPr>
             <a:r>
-              <a:rPr lang="en-US" b="1" dirty="0" smtClean="0"/>
-              <a:t>Instan</a:t>
-            </a:r>
-            <a:r>
-              <a:rPr lang="en-US" b="1" dirty="0" smtClean="0"/>
-              <a:t>ce Segmentation</a:t>
-            </a:r>
-            <a:r>
-              <a:rPr lang="en-US" dirty="0" smtClean="0"/>
+              <a:rPr lang="en-US" b="1" dirty="0"/>
+              <a:t>Instance Segmentation</a:t>
+            </a:r>
+            <a:r>
+              <a:rPr lang="en-US" dirty="0"/>
               <a:t>: Identifies each unique object on the image. </a:t>
             </a:r>
-            <a:endParaRPr lang="en-US" dirty="0" smtClean="0"/>
-          </a:p>
-          <a:p>
-            <a:endParaRPr lang="en-US" dirty="0" smtClean="0"/>
+          </a:p>
+          <a:p>
+            <a:endParaRPr lang="en-US" dirty="0"/>
           </a:p>
         </p:txBody>
       </p:sp>
@@ -6531,10 +6280,9 @@
           <a:lstStyle/>
           <a:p>
             <a:r>
-              <a:rPr lang="en-US" dirty="0" smtClean="0"/>
+              <a:rPr lang="en-US" dirty="0"/>
               <a:t>Segmentation</a:t>
             </a:r>
-            <a:endParaRPr lang="en-US" dirty="0"/>
           </a:p>
         </p:txBody>
       </p:sp>
@@ -6561,10 +6309,9 @@
           <a:lstStyle/>
           <a:p>
             <a:r>
-              <a:rPr lang="en-US" dirty="0" smtClean="0"/>
+              <a:rPr lang="en-US" dirty="0"/>
               <a:t>Semantic Segmentation</a:t>
             </a:r>
-            <a:endParaRPr lang="en-US" dirty="0"/>
           </a:p>
         </p:txBody>
       </p:sp>
@@ -6591,10 +6338,9 @@
           <a:lstStyle/>
           <a:p>
             <a:r>
-              <a:rPr lang="en-US" dirty="0" smtClean="0"/>
+              <a:rPr lang="en-US" dirty="0"/>
               <a:t>Object Detection</a:t>
             </a:r>
-            <a:endParaRPr lang="en-US" dirty="0"/>
           </a:p>
         </p:txBody>
       </p:sp>
@@ -6675,10 +6421,9 @@
           <a:lstStyle/>
           <a:p>
             <a:r>
-              <a:rPr lang="en-US" dirty="0" smtClean="0"/>
+              <a:rPr lang="en-US" dirty="0"/>
               <a:t>Instance Segmentation</a:t>
             </a:r>
-            <a:endParaRPr lang="en-US" dirty="0"/>
           </a:p>
         </p:txBody>
       </p:sp>
@@ -6692,13 +6437,6 @@
   <p:clrMapOvr>
     <a:masterClrMapping/>
   </p:clrMapOvr>
-  <p:timing>
-    <p:tnLst>
-      <p:par>
-        <p:cTn id="1" dur="indefinite" restart="never" nodeType="tmRoot"/>
-      </p:par>
-    </p:tnLst>
-  </p:timing>
 </p:sld>
 </file>
 
@@ -6740,10 +6478,9 @@
           <a:lstStyle/>
           <a:p>
             <a:r>
-              <a:rPr lang="en-US" dirty="0" smtClean="0"/>
+              <a:rPr lang="en-US" dirty="0"/>
               <a:t>Why is Semantic Segmentation Important ?</a:t>
             </a:r>
-            <a:endParaRPr lang="en-US" dirty="0"/>
           </a:p>
         </p:txBody>
       </p:sp>
@@ -6768,32 +6505,12 @@
           <a:lstStyle/>
           <a:p>
             <a:r>
-              <a:rPr lang="en-US" dirty="0" smtClean="0"/>
-              <a:t>Semantic Segmentation </a:t>
-            </a:r>
-            <a:r>
-              <a:rPr lang="en-US" dirty="0"/>
-              <a:t>is </a:t>
-            </a:r>
-            <a:r>
-              <a:rPr lang="en-US" dirty="0" smtClean="0"/>
-              <a:t>needed to have a complete </a:t>
+              <a:rPr lang="en-US" dirty="0"/>
+              <a:t>Semantic Segmentation is needed to have a complete </a:t>
             </a:r>
             <a:r>
               <a:rPr lang="en-US" b="1" dirty="0"/>
-              <a:t>S</a:t>
-            </a:r>
-            <a:r>
-              <a:rPr lang="en-US" b="1" dirty="0" smtClean="0"/>
-              <a:t>cene </a:t>
-            </a:r>
-            <a:r>
-              <a:rPr lang="en-US" b="1" dirty="0"/>
-              <a:t>U</a:t>
-            </a:r>
-            <a:r>
-              <a:rPr lang="en-US" b="1" dirty="0" smtClean="0"/>
-              <a:t>nderstanding.</a:t>
+              <a:t>Scene Understanding.</a:t>
             </a:r>
           </a:p>
           <a:p>
@@ -6801,87 +6518,57 @@
           </a:p>
           <a:p>
             <a:r>
-              <a:rPr lang="en-US" dirty="0" smtClean="0"/>
-              <a:t>An increasing </a:t>
-            </a:r>
-            <a:r>
-              <a:rPr lang="en-US" dirty="0"/>
-              <a:t>number of applications </a:t>
-            </a:r>
-            <a:r>
-              <a:rPr lang="en-US" dirty="0" smtClean="0"/>
-              <a:t>depend on </a:t>
-            </a:r>
-            <a:r>
-              <a:rPr lang="en-US" dirty="0"/>
-              <a:t>inferring knowledge from imagery. </a:t>
-            </a:r>
-            <a:endParaRPr lang="en-US" dirty="0" smtClean="0"/>
-          </a:p>
-          <a:p>
-            <a:endParaRPr lang="en-US" dirty="0" smtClean="0"/>
-          </a:p>
-          <a:p>
-            <a:r>
-              <a:rPr lang="en-US" dirty="0" err="1" smtClean="0"/>
+              <a:rPr lang="en-US" dirty="0"/>
+              <a:t>An increasing number of applications depend on inferring knowledge from imagery. </a:t>
+            </a:r>
+          </a:p>
+          <a:p>
+            <a:endParaRPr lang="en-US" dirty="0"/>
+          </a:p>
+          <a:p>
+            <a:r>
+              <a:rPr lang="en-US" dirty="0" err="1"/>
               <a:t>Eg</a:t>
             </a:r>
             <a:r>
-              <a:rPr lang="en-US" dirty="0" smtClean="0"/>
-              <a:t>: self-driving </a:t>
-            </a:r>
-            <a:r>
-              <a:rPr lang="en-US" dirty="0"/>
-              <a:t>vehicles, human-computer interaction, virtual </a:t>
-            </a:r>
-            <a:r>
-              <a:rPr lang="en-US" dirty="0" smtClean="0"/>
-              <a:t>reality, Precision Agriculture  </a:t>
-            </a:r>
-            <a:r>
-              <a:rPr lang="en-US" dirty="0"/>
-              <a:t>etc. </a:t>
-            </a:r>
-            <a:endParaRPr lang="en-US" dirty="0" smtClean="0"/>
+              <a:rPr lang="en-US" dirty="0"/>
+              <a:t>: self-driving vehicles, human-computer interaction, virtual reality, Precision Agriculture  etc. </a:t>
+            </a:r>
           </a:p>
           <a:p>
             <a:endParaRPr lang="en-US" dirty="0"/>
           </a:p>
           <a:p>
-            <a:endParaRPr lang="en-US" dirty="0" smtClean="0"/>
-          </a:p>
-          <a:p>
             <a:endParaRPr lang="en-US" dirty="0"/>
           </a:p>
           <a:p>
-            <a:endParaRPr lang="en-US" dirty="0" smtClean="0"/>
-          </a:p>
-          <a:p>
             <a:endParaRPr lang="en-US" dirty="0"/>
           </a:p>
           <a:p>
-            <a:endParaRPr lang="en-US" dirty="0" smtClean="0"/>
-          </a:p>
-          <a:p>
             <a:endParaRPr lang="en-US" dirty="0"/>
           </a:p>
           <a:p>
-            <a:endParaRPr lang="en-US" dirty="0" smtClean="0"/>
-          </a:p>
-          <a:p>
-            <a:endParaRPr lang="en-US" dirty="0" smtClean="0"/>
-          </a:p>
-          <a:p>
             <a:endParaRPr lang="en-US" dirty="0"/>
           </a:p>
           <a:p>
-            <a:r>
-              <a:rPr lang="en-US" dirty="0"/>
-              <a:t>	</a:t>
-            </a:r>
-            <a:r>
-              <a:rPr lang="en-US" dirty="0" smtClean="0"/>
-              <a:t>						</a:t>
+            <a:endParaRPr lang="en-US" dirty="0"/>
+          </a:p>
+          <a:p>
+            <a:endParaRPr lang="en-US" dirty="0"/>
+          </a:p>
+          <a:p>
+            <a:endParaRPr lang="en-US" dirty="0"/>
+          </a:p>
+          <a:p>
+            <a:endParaRPr lang="en-US" dirty="0"/>
+          </a:p>
+          <a:p>
+            <a:endParaRPr lang="en-US" dirty="0"/>
+          </a:p>
+          <a:p>
+            <a:r>
+              <a:rPr lang="en-US" dirty="0"/>
+              <a:t>							</a:t>
             </a:r>
           </a:p>
         </p:txBody>
@@ -6896,13 +6583,6 @@
   <p:clrMapOvr>
     <a:masterClrMapping/>
   </p:clrMapOvr>
-  <p:timing>
-    <p:tnLst>
-      <p:par>
-        <p:cTn id="1" dur="indefinite" restart="never" nodeType="tmRoot"/>
-      </p:par>
-    </p:tnLst>
-  </p:timing>
 </p:sld>
 </file>
 
@@ -6939,10 +6619,9 @@
           <a:lstStyle/>
           <a:p>
             <a:r>
-              <a:rPr lang="en-US" dirty="0" smtClean="0"/>
+              <a:rPr lang="en-US" dirty="0"/>
               <a:t>Semantic Segmentation</a:t>
             </a:r>
-            <a:endParaRPr lang="en-US" dirty="0"/>
           </a:p>
         </p:txBody>
       </p:sp>
@@ -6969,12 +6648,12 @@
           <a:lstStyle/>
           <a:p>
             <a:r>
-              <a:rPr lang="en-US" dirty="0" smtClean="0"/>
+              <a:rPr lang="en-US" dirty="0"/>
               <a:t>Steps of Semantic Segmentation</a:t>
             </a:r>
           </a:p>
           <a:p>
-            <a:endParaRPr lang="en-US" dirty="0" smtClean="0"/>
+            <a:endParaRPr lang="en-US" dirty="0"/>
           </a:p>
           <a:p>
             <a:pPr marL="342900" indent="-342900">
@@ -6982,20 +6661,12 @@
               <a:buAutoNum type="arabicPeriod"/>
             </a:pPr>
             <a:r>
-              <a:rPr lang="en-US" b="1" dirty="0" smtClean="0"/>
+              <a:rPr lang="en-US" b="1" dirty="0"/>
               <a:t>Origin</a:t>
             </a:r>
             <a:r>
-              <a:rPr lang="en-US" dirty="0" smtClean="0"/>
-              <a:t>:  is  needed for context. It helps in </a:t>
-            </a:r>
-            <a:r>
-              <a:rPr lang="en-US" dirty="0"/>
-              <a:t>making a prediction for a whole input</a:t>
-            </a:r>
-            <a:r>
-              <a:rPr lang="en-US" dirty="0" smtClean="0"/>
-              <a:t>.</a:t>
+              <a:rPr lang="en-US" dirty="0"/>
+              <a:t>:  is  needed for context. It helps in making a prediction for a whole input.</a:t>
             </a:r>
           </a:p>
           <a:p>
@@ -7011,24 +6682,12 @@
               <a:buAutoNum type="arabicPeriod"/>
             </a:pPr>
             <a:r>
-              <a:rPr lang="en-US" b="1" dirty="0" smtClean="0"/>
-              <a:t>Localization </a:t>
-            </a:r>
-            <a:r>
               <a:rPr lang="en-US" b="1" dirty="0"/>
-              <a:t>/ </a:t>
-            </a:r>
-            <a:r>
-              <a:rPr lang="en-US" b="1" dirty="0" smtClean="0"/>
-              <a:t>Detection</a:t>
-            </a:r>
-            <a:r>
-              <a:rPr lang="en-US" dirty="0"/>
-              <a:t>, which provide not only the classes but also additional information regarding the spatial location of those classes</a:t>
-            </a:r>
-            <a:r>
-              <a:rPr lang="en-US" dirty="0" smtClean="0"/>
-              <a:t>.</a:t>
+              <a:t>Localization / Detection</a:t>
+            </a:r>
+            <a:r>
+              <a:rPr lang="en-US" dirty="0"/>
+              <a:t>, which provide not only the classes but also additional information regarding the spatial location of those classes.</a:t>
             </a:r>
           </a:p>
           <a:p>
@@ -7048,28 +6707,12 @@
               <a:t>S</a:t>
             </a:r>
             <a:r>
-              <a:rPr lang="en-US" b="1" dirty="0" smtClean="0"/>
+              <a:rPr lang="en-US" b="1" dirty="0"/>
               <a:t>emantic Segmentation</a:t>
             </a:r>
             <a:r>
-              <a:rPr lang="en-US" dirty="0" smtClean="0"/>
-              <a:t> </a:t>
-            </a:r>
-            <a:r>
-              <a:rPr lang="en-US" dirty="0"/>
-              <a:t>achieves fine-grained </a:t>
-            </a:r>
-            <a:r>
-              <a:rPr lang="en-US" dirty="0" smtClean="0"/>
-              <a:t>inference, </a:t>
-            </a:r>
-            <a:r>
-              <a:rPr lang="en-US" dirty="0"/>
-              <a:t>so that each pixel is labeled with the class of its enclosing object </a:t>
-            </a:r>
-            <a:r>
-              <a:rPr lang="en-US" dirty="0" smtClean="0"/>
-              <a:t>region.</a:t>
+              <a:rPr lang="en-US" dirty="0"/>
+              <a:t> achieves fine-grained inference, so that each pixel is labeled with the class of its enclosing object region.</a:t>
             </a:r>
           </a:p>
           <a:p>
@@ -7082,11 +6725,7 @@
           <a:p>
             <a:r>
               <a:rPr lang="en-US" dirty="0"/>
-              <a:t>S</a:t>
-            </a:r>
-            <a:r>
-              <a:rPr lang="en-US" dirty="0" smtClean="0"/>
-              <a:t>emantic segmentation requires </a:t>
+              <a:t>Semantic segmentation requires </a:t>
             </a:r>
           </a:p>
           <a:p>
@@ -7095,16 +6734,8 @@
               <a:buChar char="•"/>
             </a:pPr>
             <a:r>
-              <a:rPr lang="en-US" dirty="0" smtClean="0"/>
-              <a:t>discrimination </a:t>
-            </a:r>
-            <a:r>
-              <a:rPr lang="en-US" dirty="0"/>
-              <a:t>at pixel level </a:t>
-            </a:r>
-            <a:r>
-              <a:rPr lang="en-US" dirty="0" smtClean="0"/>
-              <a:t>.</a:t>
+              <a:rPr lang="en-US" dirty="0"/>
+              <a:t>discrimination at pixel level .</a:t>
             </a:r>
           </a:p>
           <a:p>
@@ -7113,18 +6744,9 @@
               <a:buChar char="•"/>
             </a:pPr>
             <a:r>
-              <a:rPr lang="en-US" dirty="0" smtClean="0"/>
-              <a:t>mechanism </a:t>
-            </a:r>
-            <a:r>
-              <a:rPr lang="en-US" dirty="0"/>
-              <a:t>to project the discriminative features learnt at different stages of the encoder onto the pixel </a:t>
-            </a:r>
-            <a:r>
-              <a:rPr lang="en-US" dirty="0" smtClean="0"/>
-              <a:t>space.</a:t>
-            </a:r>
-            <a:endParaRPr lang="en-US" dirty="0"/>
+              <a:rPr lang="en-US" dirty="0"/>
+              <a:t>mechanism to project the discriminative features learnt at different stages of the encoder onto the pixel space.</a:t>
+            </a:r>
           </a:p>
         </p:txBody>
       </p:sp>
@@ -7138,13 +6760,6 @@
   <p:clrMapOvr>
     <a:masterClrMapping/>
   </p:clrMapOvr>
-  <p:timing>
-    <p:tnLst>
-      <p:par>
-        <p:cTn id="1" dur="indefinite" restart="never" nodeType="tmRoot"/>
-      </p:par>
-    </p:tnLst>
-  </p:timing>
 </p:sld>
 </file>
 
@@ -7243,13 +6858,8 @@
           <a:p>
             <a:r>
               <a:rPr lang="en-US" sz="1600" dirty="0"/>
-              <a:t>Detecting and Classifying Calcification regions in Mammographic </a:t>
-            </a:r>
-            <a:r>
-              <a:rPr lang="en-US" sz="1600" dirty="0" smtClean="0"/>
-              <a:t>Images.</a:t>
-            </a:r>
-            <a:endParaRPr lang="en-US" sz="1600" dirty="0"/>
+              <a:t>Detecting and Classifying Calcification regions in Mammographic Images.</a:t>
+            </a:r>
           </a:p>
           <a:p>
             <a:endParaRPr lang="en-US" dirty="0"/>
@@ -7621,7 +7231,7 @@
           <a:lstStyle/>
           <a:p>
             <a:r>
-              <a:rPr lang="en-US" sz="2400" b="1" dirty="0" smtClean="0"/>
+              <a:rPr lang="en-US" sz="2400" b="1" dirty="0"/>
               <a:t>Faster R-CNN</a:t>
             </a:r>
             <a:endParaRPr lang="en-US" sz="2400" dirty="0"/>
@@ -7651,17 +7261,17 @@
           <a:lstStyle/>
           <a:p>
             <a:r>
-              <a:rPr lang="en-US" b="1" dirty="0" smtClean="0"/>
+              <a:rPr lang="en-US" b="1" dirty="0"/>
               <a:t>  </a:t>
             </a:r>
           </a:p>
           <a:p>
             <a:r>
-              <a:rPr lang="en-US" b="1" dirty="0" smtClean="0"/>
+              <a:rPr lang="en-US" b="1" dirty="0"/>
               <a:t>1)  Input Image</a:t>
             </a:r>
             <a:r>
-              <a:rPr lang="en-US" dirty="0" smtClean="0"/>
+              <a:rPr lang="en-US" dirty="0"/>
               <a:t>: </a:t>
             </a:r>
           </a:p>
@@ -7671,47 +7281,45 @@
               <a:buChar char="•"/>
             </a:pPr>
             <a:r>
-              <a:rPr lang="en-US" dirty="0" smtClean="0"/>
+              <a:rPr lang="en-US" dirty="0"/>
               <a:t>The input images are represented as </a:t>
             </a:r>
             <a:r>
-              <a:rPr lang="en-US" i="1" dirty="0" err="1" smtClean="0"/>
+              <a:rPr lang="en-US" i="1" dirty="0" err="1"/>
               <a:t>Height</a:t>
             </a:r>
             <a:r>
-              <a:rPr lang="en-US" dirty="0" err="1" smtClean="0"/>
+              <a:rPr lang="en-US" dirty="0" err="1"/>
               <a:t>×</a:t>
             </a:r>
             <a:r>
-              <a:rPr lang="en-US" i="1" dirty="0" err="1" smtClean="0"/>
+              <a:rPr lang="en-US" i="1" dirty="0" err="1"/>
               <a:t>Width</a:t>
             </a:r>
             <a:r>
-              <a:rPr lang="en-US" dirty="0" err="1" smtClean="0"/>
+              <a:rPr lang="en-US" dirty="0" err="1"/>
               <a:t>×</a:t>
             </a:r>
             <a:r>
-              <a:rPr lang="en-US" i="1" dirty="0" err="1" smtClean="0"/>
+              <a:rPr lang="en-US" i="1" dirty="0" err="1"/>
               <a:t>Depth</a:t>
             </a:r>
             <a:r>
-              <a:rPr lang="en-US" dirty="0" smtClean="0"/>
+              <a:rPr lang="en-US" dirty="0"/>
               <a:t> tensors  </a:t>
             </a:r>
           </a:p>
           <a:p>
             <a:r>
-              <a:rPr lang="en-US" dirty="0" smtClean="0"/>
+              <a:rPr lang="en-US" dirty="0"/>
               <a:t> </a:t>
             </a:r>
-            <a:endParaRPr lang="en-US" dirty="0"/>
-          </a:p>
-          <a:p>
-            <a:r>
-              <a:rPr lang="en-US" b="1" dirty="0" smtClean="0"/>
+          </a:p>
+          <a:p>
+            <a:r>
+              <a:rPr lang="en-US" b="1" dirty="0"/>
               <a:t>2) Pre-Trained CNN</a:t>
             </a:r>
-            <a:endParaRPr lang="en-US" b="1" dirty="0"/>
           </a:p>
           <a:p>
             <a:pPr marL="285750" indent="-285750">
@@ -7719,38 +7327,17 @@
               <a:buChar char="•"/>
             </a:pPr>
             <a:r>
-              <a:rPr lang="en-US" dirty="0" smtClean="0"/>
-              <a:t>They  are </a:t>
-            </a:r>
-            <a:r>
-              <a:rPr lang="en-US" dirty="0"/>
-              <a:t>passed through a </a:t>
-            </a:r>
-            <a:r>
-              <a:rPr lang="en-US" dirty="0" smtClean="0"/>
-              <a:t>Pre-Trained </a:t>
-            </a:r>
-            <a:r>
-              <a:rPr lang="en-US" dirty="0"/>
-              <a:t>CNN up until an intermediate layer, ending up with a convolutional feature map. </a:t>
-            </a:r>
-            <a:endParaRPr lang="en-US" dirty="0" smtClean="0"/>
-          </a:p>
-          <a:p>
-            <a:endParaRPr lang="en-US" b="1" dirty="0" smtClean="0"/>
-          </a:p>
-          <a:p>
-            <a:r>
-              <a:rPr lang="en-US" b="1" dirty="0" smtClean="0"/>
-              <a:t>3) RPN:  (Region </a:t>
-            </a:r>
+              <a:rPr lang="en-US" dirty="0"/>
+              <a:t>They  are passed through a Pre-Trained CNN up until an intermediate layer, ending up with a convolutional feature map. </a:t>
+            </a:r>
+          </a:p>
+          <a:p>
+            <a:endParaRPr lang="en-US" b="1" dirty="0"/>
+          </a:p>
+          <a:p>
             <a:r>
               <a:rPr lang="en-US" b="1" dirty="0"/>
-              <a:t>Proposal </a:t>
-            </a:r>
-            <a:r>
-              <a:rPr lang="en-US" b="1" dirty="0" smtClean="0"/>
-              <a:t>Network) </a:t>
+              <a:t>3) RPN:  (Region Proposal Network) </a:t>
             </a:r>
           </a:p>
           <a:p>
@@ -7759,12 +7346,8 @@
               <a:buChar char="•"/>
             </a:pPr>
             <a:r>
-              <a:rPr lang="en-US" dirty="0" smtClean="0"/>
-              <a:t>Using </a:t>
-            </a:r>
-            <a:r>
-              <a:rPr lang="en-US" dirty="0"/>
-              <a:t>the features that the CNN computed, it is used to find up to a </a:t>
+              <a:rPr lang="en-US" dirty="0"/>
+              <a:t>Using the features that the CNN computed, it is used to find up to a </a:t>
             </a:r>
             <a:r>
               <a:rPr lang="en-US" i="1" dirty="0"/>
@@ -7772,27 +7355,23 @@
             </a:r>
             <a:r>
               <a:rPr lang="en-US" dirty="0"/>
-              <a:t> of regions (bounding boxes), which may contain </a:t>
-            </a:r>
-            <a:r>
-              <a:rPr lang="en-US" dirty="0" smtClean="0"/>
-              <a:t>objects.</a:t>
-            </a:r>
-          </a:p>
-          <a:p>
-            <a:endParaRPr lang="en-US" b="1" dirty="0" smtClean="0"/>
-          </a:p>
-          <a:p>
-            <a:r>
-              <a:rPr lang="en-US" b="1" dirty="0" smtClean="0"/>
+              <a:t> of regions (bounding boxes), which may contain objects.</a:t>
+            </a:r>
+          </a:p>
+          <a:p>
+            <a:endParaRPr lang="en-US" b="1" dirty="0"/>
+          </a:p>
+          <a:p>
+            <a:r>
+              <a:rPr lang="en-US" b="1" dirty="0"/>
               <a:t>4) </a:t>
             </a:r>
             <a:r>
-              <a:rPr lang="en-US" b="1" dirty="0" err="1" smtClean="0"/>
+              <a:rPr lang="en-US" b="1" dirty="0" err="1"/>
               <a:t>RoIP</a:t>
             </a:r>
             <a:r>
-              <a:rPr lang="en-US" b="1" dirty="0" smtClean="0"/>
+              <a:rPr lang="en-US" b="1" dirty="0"/>
               <a:t>: (Region of Interest Pooling). </a:t>
             </a:r>
           </a:p>
@@ -7803,23 +7382,19 @@
             </a:pPr>
             <a:r>
               <a:rPr lang="en-US" dirty="0"/>
-              <a:t>P</a:t>
-            </a:r>
-            <a:r>
-              <a:rPr lang="en-US" dirty="0" smtClean="0"/>
-              <a:t>erforms Max Pooling on Inputs of non uniform size, and produces a fixed size feature map</a:t>
-            </a:r>
-            <a:r>
-              <a:rPr lang="en-US" b="1" dirty="0" smtClean="0"/>
+              <a:t>Performs Max Pooling on Inputs of non uniform size, and produces a fixed size feature map</a:t>
+            </a:r>
+            <a:r>
+              <a:rPr lang="en-US" b="1" dirty="0"/>
               <a:t>.</a:t>
             </a:r>
           </a:p>
           <a:p>
-            <a:endParaRPr lang="en-US" b="1" dirty="0" smtClean="0"/>
-          </a:p>
-          <a:p>
-            <a:r>
-              <a:rPr lang="en-US" b="1" dirty="0" smtClean="0"/>
+            <a:endParaRPr lang="en-US" b="1" dirty="0"/>
+          </a:p>
+          <a:p>
+            <a:r>
+              <a:rPr lang="en-US" b="1" dirty="0"/>
               <a:t>5) R-CNN  </a:t>
             </a:r>
           </a:p>
@@ -7829,7 +7404,7 @@
               <a:buChar char="•"/>
             </a:pPr>
             <a:r>
-              <a:rPr lang="en-US" dirty="0" smtClean="0"/>
+              <a:rPr lang="en-US" dirty="0"/>
               <a:t>Classifies the content in the bounding boxes or discards it.</a:t>
             </a:r>
           </a:p>
@@ -7839,7 +7414,7 @@
               <a:buChar char="•"/>
             </a:pPr>
             <a:r>
-              <a:rPr lang="en-US" dirty="0" smtClean="0"/>
+              <a:rPr lang="en-US" dirty="0"/>
               <a:t>Adjusts the Bounding Box co-ordinates for a best fit.</a:t>
             </a:r>
           </a:p>
@@ -7952,38 +7527,38 @@
           <a:bodyPr/>
           <a:lstStyle/>
           <a:p>
-            <a:endParaRPr lang="en-US" dirty="0" smtClean="0"/>
-          </a:p>
-          <a:p>
-            <a:endParaRPr lang="en-US" dirty="0" smtClean="0"/>
-          </a:p>
-          <a:p>
-            <a:r>
-              <a:rPr lang="en-US" b="1" dirty="0" smtClean="0"/>
+            <a:endParaRPr lang="en-US" dirty="0"/>
+          </a:p>
+          <a:p>
+            <a:endParaRPr lang="en-US" dirty="0"/>
+          </a:p>
+          <a:p>
+            <a:r>
+              <a:rPr lang="en-US" b="1" dirty="0"/>
               <a:t>Pre Trained CNN</a:t>
             </a:r>
             <a:r>
-              <a:rPr lang="en-US" dirty="0" smtClean="0"/>
+              <a:rPr lang="en-US" dirty="0"/>
               <a:t>.</a:t>
             </a:r>
           </a:p>
           <a:p>
             <a:r>
-              <a:rPr lang="en-US" dirty="0" smtClean="0"/>
+              <a:rPr lang="en-US" dirty="0"/>
               <a:t>(Could be VGG or </a:t>
             </a:r>
             <a:r>
-              <a:rPr lang="en-US" dirty="0" err="1" smtClean="0"/>
+              <a:rPr lang="en-US" dirty="0" err="1"/>
               <a:t>ResNet</a:t>
             </a:r>
             <a:r>
-              <a:rPr lang="en-US" dirty="0" smtClean="0"/>
+              <a:rPr lang="en-US" dirty="0"/>
               <a:t> or any other suitably trained CNN)</a:t>
             </a:r>
           </a:p>
           <a:p>
             <a:r>
-              <a:rPr lang="en-US" dirty="0" smtClean="0"/>
+              <a:rPr lang="en-US" dirty="0"/>
               <a:t> </a:t>
             </a:r>
           </a:p>
@@ -7996,14 +7571,13 @@
               <a:rPr lang="en-US" dirty="0"/>
               <a:t>Each convolutional layer creates abstractions based on the previous information. </a:t>
             </a:r>
-            <a:endParaRPr lang="en-US" dirty="0" smtClean="0"/>
           </a:p>
           <a:p>
             <a:pPr marL="285750" indent="-285750">
               <a:buFont typeface="Arial" panose="020B0604020202020204" pitchFamily="34" charset="0"/>
               <a:buChar char="•"/>
             </a:pPr>
-            <a:endParaRPr lang="en-US" dirty="0" smtClean="0"/>
+            <a:endParaRPr lang="en-US" dirty="0"/>
           </a:p>
           <a:p>
             <a:pPr marL="285750" indent="-285750">
@@ -8011,16 +7585,8 @@
               <a:buChar char="•"/>
             </a:pPr>
             <a:r>
-              <a:rPr lang="en-US" dirty="0" smtClean="0"/>
-              <a:t>The </a:t>
-            </a:r>
-            <a:r>
-              <a:rPr lang="en-US" dirty="0"/>
-              <a:t>first layers usually learn edges, the second finds patterns in edges in order to activate for more complex shapes and so forth. Eventually we end up with a convolutional feature map which has spatial dimensions much smaller than the original image, but greater depth</a:t>
-            </a:r>
-            <a:r>
-              <a:rPr lang="en-US" dirty="0" smtClean="0"/>
-              <a:t>.</a:t>
+              <a:rPr lang="en-US" dirty="0"/>
+              <a:t>The first layers usually learn edges, the second finds patterns in edges in order to activate for more complex shapes and so forth. Eventually we end up with a convolutional feature map which has spatial dimensions much smaller than the original image, but greater depth.</a:t>
             </a:r>
           </a:p>
           <a:p>
@@ -8028,7 +7594,7 @@
               <a:buFont typeface="Arial" panose="020B0604020202020204" pitchFamily="34" charset="0"/>
               <a:buChar char="•"/>
             </a:pPr>
-            <a:endParaRPr lang="en-US" dirty="0" smtClean="0"/>
+            <a:endParaRPr lang="en-US" dirty="0"/>
           </a:p>
           <a:p>
             <a:pPr marL="285750" indent="-285750">
@@ -8036,28 +7602,16 @@
               <a:buChar char="•"/>
             </a:pPr>
             <a:r>
-              <a:rPr lang="en-US" dirty="0" smtClean="0"/>
-              <a:t>The </a:t>
-            </a:r>
-            <a:r>
-              <a:rPr lang="en-US" dirty="0"/>
-              <a:t>width and height of the feature map decrease because of the </a:t>
-            </a:r>
-            <a:r>
-              <a:rPr lang="en-US" dirty="0" err="1" smtClean="0"/>
+              <a:rPr lang="en-US" dirty="0"/>
+              <a:t>The width and height of the feature map decrease because of the </a:t>
+            </a:r>
+            <a:r>
+              <a:rPr lang="en-US" dirty="0" err="1"/>
               <a:t>pooling,and</a:t>
             </a:r>
             <a:r>
-              <a:rPr lang="en-US" dirty="0" smtClean="0"/>
-              <a:t> </a:t>
-            </a:r>
-            <a:r>
-              <a:rPr lang="en-US" dirty="0"/>
-              <a:t>the depth increases based on the number of filters the convolutional layer learns</a:t>
-            </a:r>
-            <a:r>
-              <a:rPr lang="en-US" dirty="0" smtClean="0"/>
-              <a:t>.</a:t>
+              <a:rPr lang="en-US" dirty="0"/>
+              <a:t> the depth increases based on the number of filters the convolutional layer learns.</a:t>
             </a:r>
           </a:p>
           <a:p>
@@ -8065,7 +7619,7 @@
               <a:buFont typeface="Arial" panose="020B0604020202020204" pitchFamily="34" charset="0"/>
               <a:buChar char="•"/>
             </a:pPr>
-            <a:endParaRPr lang="en-US" dirty="0" smtClean="0"/>
+            <a:endParaRPr lang="en-US" dirty="0"/>
           </a:p>
           <a:p>
             <a:pPr marL="285750" indent="-285750">
@@ -8076,7 +7630,6 @@
               <a:rPr lang="en-US" dirty="0"/>
               <a:t>In its depth, the convolutional feature map has encoded all the information for the image while maintaining the location of the “things” it has encoded relative to the original image. </a:t>
             </a:r>
-            <a:endParaRPr lang="en-US" dirty="0" smtClean="0"/>
           </a:p>
           <a:p>
             <a:endParaRPr lang="en-US" dirty="0"/>

</xml_diff>